<commit_message>
slides from WITS 2022
</commit_message>
<xml_diff>
--- a/doc/wits-discussion.pptx
+++ b/doc/wits-discussion.pptx
@@ -13,12 +13,12 @@
     <p:sldId id="466" r:id="rId4"/>
     <p:sldId id="461" r:id="rId5"/>
     <p:sldId id="465" r:id="rId6"/>
-    <p:sldId id="477" r:id="rId7"/>
-    <p:sldId id="467" r:id="rId8"/>
-    <p:sldId id="468" r:id="rId9"/>
-    <p:sldId id="462" r:id="rId10"/>
-    <p:sldId id="476" r:id="rId11"/>
-    <p:sldId id="469" r:id="rId12"/>
+    <p:sldId id="467" r:id="rId7"/>
+    <p:sldId id="468" r:id="rId8"/>
+    <p:sldId id="477" r:id="rId9"/>
+    <p:sldId id="476" r:id="rId10"/>
+    <p:sldId id="469" r:id="rId11"/>
+    <p:sldId id="462" r:id="rId12"/>
     <p:sldId id="470" r:id="rId13"/>
     <p:sldId id="471" r:id="rId14"/>
     <p:sldId id="473" r:id="rId15"/>
@@ -5784,7 +5784,7 @@
           <a:p>
             <a:fld id="{A180D43F-ACE1-D140-AD95-9AB5F0193656}" type="slidenum">
               <a:rPr lang="en-US" smtClean="0"/>
-              <a:t>6</a:t>
+              <a:t>7</a:t>
             </a:fld>
             <a:endParaRPr lang="en-US"/>
           </a:p>
@@ -5793,7 +5793,7 @@
     </p:spTree>
     <p:extLst>
       <p:ext uri="{BB962C8B-B14F-4D97-AF65-F5344CB8AC3E}">
-        <p14:creationId xmlns:p14="http://schemas.microsoft.com/office/powerpoint/2010/main" val="3459235413"/>
+        <p14:creationId xmlns:p14="http://schemas.microsoft.com/office/powerpoint/2010/main" val="1232677784"/>
       </p:ext>
     </p:extLst>
   </p:cSld>
@@ -5877,7 +5877,7 @@
     </p:spTree>
     <p:extLst>
       <p:ext uri="{BB962C8B-B14F-4D97-AF65-F5344CB8AC3E}">
-        <p14:creationId xmlns:p14="http://schemas.microsoft.com/office/powerpoint/2010/main" val="1232677784"/>
+        <p14:creationId xmlns:p14="http://schemas.microsoft.com/office/powerpoint/2010/main" val="3459235413"/>
       </p:ext>
     </p:extLst>
   </p:cSld>
@@ -9325,6 +9325,57 @@
           </a:p>
         </p:txBody>
       </p:sp>
+      <p:sp>
+        <p:nvSpPr>
+          <p:cNvPr id="7" name="TextBox 6">
+            <a:extLst>
+              <a:ext uri="{FF2B5EF4-FFF2-40B4-BE49-F238E27FC236}">
+                <a16:creationId xmlns:a16="http://schemas.microsoft.com/office/drawing/2014/main" id="{1267226E-0244-8244-B286-62BCA6E6981D}"/>
+              </a:ext>
+            </a:extLst>
+          </p:cNvPr>
+          <p:cNvSpPr txBox="1"/>
+          <p:nvPr/>
+        </p:nvSpPr>
+        <p:spPr>
+          <a:xfrm>
+            <a:off x="1984201" y="4673025"/>
+            <a:ext cx="8223598" cy="584775"/>
+          </a:xfrm>
+          <a:prstGeom prst="rect">
+            <a:avLst/>
+          </a:prstGeom>
+          <a:noFill/>
+        </p:spPr>
+        <p:txBody>
+          <a:bodyPr wrap="none" rtlCol="0">
+            <a:spAutoFit/>
+          </a:bodyPr>
+          <a:lstStyle/>
+          <a:p>
+            <a:r>
+              <a:rPr lang="en-US" sz="3200" dirty="0"/>
+              <a:t>https://</a:t>
+            </a:r>
+            <a:r>
+              <a:rPr lang="en-US" sz="3200" dirty="0" err="1"/>
+              <a:t>www.seas.upenn.edu</a:t>
+            </a:r>
+            <a:r>
+              <a:rPr lang="en-US" sz="3200" dirty="0"/>
+              <a:t>/~</a:t>
+            </a:r>
+            <a:r>
+              <a:rPr lang="en-US" sz="3200" dirty="0" err="1"/>
+              <a:t>sweirich</a:t>
+            </a:r>
+            <a:r>
+              <a:rPr lang="en-US" sz="3200" dirty="0"/>
+              <a:t>/wits22/</a:t>
+            </a:r>
+          </a:p>
+        </p:txBody>
+      </p:sp>
     </p:spTree>
     <p:extLst>
       <p:ext uri="{BB962C8B-B14F-4D97-AF65-F5344CB8AC3E}">
@@ -9339,637 +9390,6 @@
 </file>
 
 <file path=ppt/slides/slide10.xml><?xml version="1.0" encoding="utf-8"?>
-<p:sld xmlns:a="http://schemas.openxmlformats.org/drawingml/2006/main" xmlns:r="http://schemas.openxmlformats.org/officeDocument/2006/relationships" xmlns:p="http://schemas.openxmlformats.org/presentationml/2006/main">
-  <p:cSld>
-    <p:spTree>
-      <p:nvGrpSpPr>
-        <p:cNvPr id="1" name=""/>
-        <p:cNvGrpSpPr/>
-        <p:nvPr/>
-      </p:nvGrpSpPr>
-      <p:grpSpPr>
-        <a:xfrm>
-          <a:off x="0" y="0"/>
-          <a:ext cx="0" cy="0"/>
-          <a:chOff x="0" y="0"/>
-          <a:chExt cx="0" cy="0"/>
-        </a:xfrm>
-      </p:grpSpPr>
-      <p:sp>
-        <p:nvSpPr>
-          <p:cNvPr id="2" name="Title 1">
-            <a:extLst>
-              <a:ext uri="{FF2B5EF4-FFF2-40B4-BE49-F238E27FC236}">
-                <a16:creationId xmlns:a16="http://schemas.microsoft.com/office/drawing/2014/main" id="{71733D05-76FC-F341-B142-E6B3E87B690B}"/>
-              </a:ext>
-            </a:extLst>
-          </p:cNvPr>
-          <p:cNvSpPr>
-            <a:spLocks noGrp="1"/>
-          </p:cNvSpPr>
-          <p:nvPr>
-            <p:ph type="title"/>
-          </p:nvPr>
-        </p:nvSpPr>
-        <p:spPr/>
-        <p:txBody>
-          <a:bodyPr/>
-          <a:lstStyle/>
-          <a:p>
-            <a:r>
-              <a:rPr lang="en-US" dirty="0"/>
-              <a:t>Implementation interface</a:t>
-            </a:r>
-          </a:p>
-        </p:txBody>
-      </p:sp>
-      <p:sp>
-        <p:nvSpPr>
-          <p:cNvPr id="3" name="Content Placeholder 2">
-            <a:extLst>
-              <a:ext uri="{FF2B5EF4-FFF2-40B4-BE49-F238E27FC236}">
-                <a16:creationId xmlns:a16="http://schemas.microsoft.com/office/drawing/2014/main" id="{D235C0EA-2726-214E-8F88-1C3D1060FFCC}"/>
-              </a:ext>
-            </a:extLst>
-          </p:cNvPr>
-          <p:cNvSpPr>
-            <a:spLocks noGrp="1"/>
-          </p:cNvSpPr>
-          <p:nvPr>
-            <p:ph idx="1"/>
-          </p:nvPr>
-        </p:nvSpPr>
-        <p:spPr/>
-        <p:txBody>
-          <a:bodyPr/>
-          <a:lstStyle/>
-          <a:p>
-            <a:pPr marL="0" indent="0">
-              <a:buNone/>
-            </a:pPr>
-            <a:r>
-              <a:rPr lang="en-US" dirty="0">
-                <a:solidFill>
-                  <a:srgbClr val="0000FF"/>
-                </a:solidFill>
-                <a:latin typeface="Menlo" panose="020B0609030804020204" pitchFamily="49" charset="0"/>
-              </a:rPr>
-              <a:t>data</a:t>
-            </a:r>
-            <a:r>
-              <a:rPr lang="en-US" dirty="0">
-                <a:solidFill>
-                  <a:srgbClr val="000000"/>
-                </a:solidFill>
-                <a:latin typeface="Menlo" panose="020B0609030804020204" pitchFamily="49" charset="0"/>
-              </a:rPr>
-              <a:t> </a:t>
-            </a:r>
-            <a:r>
-              <a:rPr lang="en-US" dirty="0" err="1">
-                <a:solidFill>
-                  <a:srgbClr val="0000FF"/>
-                </a:solidFill>
-                <a:latin typeface="Menlo" panose="020B0609030804020204" pitchFamily="49" charset="0"/>
-              </a:rPr>
-              <a:t>LambdaImpl</a:t>
-            </a:r>
-            <a:r>
-              <a:rPr lang="en-US" dirty="0">
-                <a:solidFill>
-                  <a:srgbClr val="000000"/>
-                </a:solidFill>
-                <a:latin typeface="Menlo" panose="020B0609030804020204" pitchFamily="49" charset="0"/>
-              </a:rPr>
-              <a:t> = </a:t>
-            </a:r>
-          </a:p>
-          <a:p>
-            <a:pPr marL="0" indent="0">
-              <a:buNone/>
-            </a:pPr>
-            <a:r>
-              <a:rPr lang="en-US" dirty="0">
-                <a:solidFill>
-                  <a:srgbClr val="000000"/>
-                </a:solidFill>
-                <a:latin typeface="Menlo" panose="020B0609030804020204" pitchFamily="49" charset="0"/>
-              </a:rPr>
-              <a:t>  </a:t>
-            </a:r>
-            <a:r>
-              <a:rPr lang="en-US" dirty="0" err="1">
-                <a:solidFill>
-                  <a:srgbClr val="0000FF"/>
-                </a:solidFill>
-                <a:latin typeface="Menlo" panose="020B0609030804020204" pitchFamily="49" charset="0"/>
-              </a:rPr>
-              <a:t>forall</a:t>
-            </a:r>
-            <a:r>
-              <a:rPr lang="en-US" dirty="0">
-                <a:solidFill>
-                  <a:srgbClr val="000000"/>
-                </a:solidFill>
-                <a:latin typeface="Menlo" panose="020B0609030804020204" pitchFamily="49" charset="0"/>
-              </a:rPr>
-              <a:t> </a:t>
-            </a:r>
-            <a:r>
-              <a:rPr lang="en-US" dirty="0">
-                <a:solidFill>
-                  <a:srgbClr val="001080"/>
-                </a:solidFill>
-                <a:latin typeface="Menlo" panose="020B0609030804020204" pitchFamily="49" charset="0"/>
-              </a:rPr>
-              <a:t>a</a:t>
-            </a:r>
-            <a:r>
-              <a:rPr lang="en-US" dirty="0">
-                <a:solidFill>
-                  <a:srgbClr val="000000"/>
-                </a:solidFill>
-                <a:latin typeface="Menlo" panose="020B0609030804020204" pitchFamily="49" charset="0"/>
-              </a:rPr>
-              <a:t>. </a:t>
-            </a:r>
-            <a:r>
-              <a:rPr lang="en-US" dirty="0" err="1">
-                <a:solidFill>
-                  <a:srgbClr val="0000FF"/>
-                </a:solidFill>
-                <a:latin typeface="Menlo" panose="020B0609030804020204" pitchFamily="49" charset="0"/>
-              </a:rPr>
-              <a:t>NFData</a:t>
-            </a:r>
-            <a:r>
-              <a:rPr lang="en-US" dirty="0">
-                <a:solidFill>
-                  <a:srgbClr val="000000"/>
-                </a:solidFill>
-                <a:latin typeface="Menlo" panose="020B0609030804020204" pitchFamily="49" charset="0"/>
-              </a:rPr>
-              <a:t> </a:t>
-            </a:r>
-            <a:r>
-              <a:rPr lang="en-US" dirty="0">
-                <a:solidFill>
-                  <a:srgbClr val="001080"/>
-                </a:solidFill>
-                <a:latin typeface="Menlo" panose="020B0609030804020204" pitchFamily="49" charset="0"/>
-              </a:rPr>
-              <a:t>a</a:t>
-            </a:r>
-            <a:r>
-              <a:rPr lang="en-US" dirty="0">
-                <a:solidFill>
-                  <a:srgbClr val="000000"/>
-                </a:solidFill>
-                <a:latin typeface="Menlo" panose="020B0609030804020204" pitchFamily="49" charset="0"/>
-              </a:rPr>
-              <a:t> =&gt; </a:t>
-            </a:r>
-            <a:r>
-              <a:rPr lang="en-US" dirty="0" err="1">
-                <a:solidFill>
-                  <a:srgbClr val="000000"/>
-                </a:solidFill>
-                <a:latin typeface="Menlo" panose="020B0609030804020204" pitchFamily="49" charset="0"/>
-              </a:rPr>
-              <a:t>LambdaImpl</a:t>
-            </a:r>
-            <a:endParaRPr lang="en-US" dirty="0">
-              <a:solidFill>
-                <a:srgbClr val="000000"/>
-              </a:solidFill>
-              <a:latin typeface="Menlo" panose="020B0609030804020204" pitchFamily="49" charset="0"/>
-            </a:endParaRPr>
-          </a:p>
-          <a:p>
-            <a:pPr marL="0" indent="0">
-              <a:buNone/>
-            </a:pPr>
-            <a:r>
-              <a:rPr lang="en-US" dirty="0">
-                <a:solidFill>
-                  <a:srgbClr val="000000"/>
-                </a:solidFill>
-                <a:latin typeface="Menlo" panose="020B0609030804020204" pitchFamily="49" charset="0"/>
-              </a:rPr>
-              <a:t>  { </a:t>
-            </a:r>
-            <a:r>
-              <a:rPr lang="en-US" dirty="0" err="1">
-                <a:solidFill>
-                  <a:srgbClr val="001080"/>
-                </a:solidFill>
-                <a:latin typeface="Menlo" panose="020B0609030804020204" pitchFamily="49" charset="0"/>
-              </a:rPr>
-              <a:t>impl_name</a:t>
-            </a:r>
-            <a:r>
-              <a:rPr lang="en-US" dirty="0">
-                <a:solidFill>
-                  <a:srgbClr val="000000"/>
-                </a:solidFill>
-                <a:latin typeface="Menlo" panose="020B0609030804020204" pitchFamily="49" charset="0"/>
-              </a:rPr>
-              <a:t> :: </a:t>
-            </a:r>
-            <a:r>
-              <a:rPr lang="en-US" dirty="0">
-                <a:solidFill>
-                  <a:srgbClr val="0000FF"/>
-                </a:solidFill>
-                <a:latin typeface="Menlo" panose="020B0609030804020204" pitchFamily="49" charset="0"/>
-              </a:rPr>
-              <a:t>String</a:t>
-            </a:r>
-            <a:r>
-              <a:rPr lang="en-US" dirty="0">
-                <a:solidFill>
-                  <a:srgbClr val="000000"/>
-                </a:solidFill>
-                <a:latin typeface="Menlo" panose="020B0609030804020204" pitchFamily="49" charset="0"/>
-              </a:rPr>
-              <a:t>,</a:t>
-            </a:r>
-          </a:p>
-          <a:p>
-            <a:pPr marL="0" indent="0">
-              <a:buNone/>
-            </a:pPr>
-            <a:r>
-              <a:rPr lang="en-US" dirty="0">
-                <a:solidFill>
-                  <a:srgbClr val="001080"/>
-                </a:solidFill>
-                <a:latin typeface="Menlo" panose="020B0609030804020204" pitchFamily="49" charset="0"/>
-              </a:rPr>
-              <a:t>    </a:t>
-            </a:r>
-            <a:r>
-              <a:rPr lang="en-US" dirty="0" err="1">
-                <a:solidFill>
-                  <a:srgbClr val="001080"/>
-                </a:solidFill>
-                <a:latin typeface="Menlo" panose="020B0609030804020204" pitchFamily="49" charset="0"/>
-              </a:rPr>
-              <a:t>impl_fromLC</a:t>
-            </a:r>
-            <a:r>
-              <a:rPr lang="en-US" dirty="0">
-                <a:solidFill>
-                  <a:srgbClr val="000000"/>
-                </a:solidFill>
-                <a:latin typeface="Menlo" panose="020B0609030804020204" pitchFamily="49" charset="0"/>
-              </a:rPr>
-              <a:t> :: </a:t>
-            </a:r>
-            <a:r>
-              <a:rPr lang="en-US" dirty="0">
-                <a:solidFill>
-                  <a:srgbClr val="0000FF"/>
-                </a:solidFill>
-                <a:latin typeface="Menlo" panose="020B0609030804020204" pitchFamily="49" charset="0"/>
-              </a:rPr>
-              <a:t>LC</a:t>
-            </a:r>
-            <a:r>
-              <a:rPr lang="en-US" dirty="0">
-                <a:solidFill>
-                  <a:srgbClr val="000000"/>
-                </a:solidFill>
-                <a:latin typeface="Menlo" panose="020B0609030804020204" pitchFamily="49" charset="0"/>
-              </a:rPr>
-              <a:t> </a:t>
-            </a:r>
-            <a:r>
-              <a:rPr lang="en-US" dirty="0" err="1">
-                <a:solidFill>
-                  <a:srgbClr val="0000FF"/>
-                </a:solidFill>
-                <a:latin typeface="Menlo" panose="020B0609030804020204" pitchFamily="49" charset="0"/>
-              </a:rPr>
-              <a:t>IdInt</a:t>
-            </a:r>
-            <a:r>
-              <a:rPr lang="en-US" dirty="0">
-                <a:solidFill>
-                  <a:srgbClr val="000000"/>
-                </a:solidFill>
-                <a:latin typeface="Menlo" panose="020B0609030804020204" pitchFamily="49" charset="0"/>
-              </a:rPr>
-              <a:t> -&gt; </a:t>
-            </a:r>
-            <a:r>
-              <a:rPr lang="en-US" dirty="0">
-                <a:solidFill>
-                  <a:srgbClr val="001080"/>
-                </a:solidFill>
-                <a:latin typeface="Menlo" panose="020B0609030804020204" pitchFamily="49" charset="0"/>
-              </a:rPr>
-              <a:t>a</a:t>
-            </a:r>
-            <a:r>
-              <a:rPr lang="en-US" dirty="0">
-                <a:solidFill>
-                  <a:srgbClr val="000000"/>
-                </a:solidFill>
-                <a:latin typeface="Menlo" panose="020B0609030804020204" pitchFamily="49" charset="0"/>
-              </a:rPr>
-              <a:t>,</a:t>
-            </a:r>
-          </a:p>
-          <a:p>
-            <a:pPr marL="0" indent="0">
-              <a:buNone/>
-            </a:pPr>
-            <a:r>
-              <a:rPr lang="en-US" dirty="0">
-                <a:solidFill>
-                  <a:srgbClr val="001080"/>
-                </a:solidFill>
-                <a:latin typeface="Menlo" panose="020B0609030804020204" pitchFamily="49" charset="0"/>
-              </a:rPr>
-              <a:t>    </a:t>
-            </a:r>
-            <a:r>
-              <a:rPr lang="en-US" dirty="0" err="1">
-                <a:solidFill>
-                  <a:srgbClr val="001080"/>
-                </a:solidFill>
-                <a:latin typeface="Menlo" panose="020B0609030804020204" pitchFamily="49" charset="0"/>
-              </a:rPr>
-              <a:t>impl_toLC</a:t>
-            </a:r>
-            <a:r>
-              <a:rPr lang="en-US" dirty="0">
-                <a:solidFill>
-                  <a:srgbClr val="000000"/>
-                </a:solidFill>
-                <a:latin typeface="Menlo" panose="020B0609030804020204" pitchFamily="49" charset="0"/>
-              </a:rPr>
-              <a:t> :: </a:t>
-            </a:r>
-            <a:r>
-              <a:rPr lang="en-US" dirty="0">
-                <a:solidFill>
-                  <a:srgbClr val="001080"/>
-                </a:solidFill>
-                <a:latin typeface="Menlo" panose="020B0609030804020204" pitchFamily="49" charset="0"/>
-              </a:rPr>
-              <a:t>a</a:t>
-            </a:r>
-            <a:r>
-              <a:rPr lang="en-US" dirty="0">
-                <a:solidFill>
-                  <a:srgbClr val="000000"/>
-                </a:solidFill>
-                <a:latin typeface="Menlo" panose="020B0609030804020204" pitchFamily="49" charset="0"/>
-              </a:rPr>
-              <a:t> -&gt; </a:t>
-            </a:r>
-            <a:r>
-              <a:rPr lang="en-US" dirty="0">
-                <a:solidFill>
-                  <a:srgbClr val="0000FF"/>
-                </a:solidFill>
-                <a:latin typeface="Menlo" panose="020B0609030804020204" pitchFamily="49" charset="0"/>
-              </a:rPr>
-              <a:t>LC</a:t>
-            </a:r>
-            <a:r>
-              <a:rPr lang="en-US" dirty="0">
-                <a:solidFill>
-                  <a:srgbClr val="000000"/>
-                </a:solidFill>
-                <a:latin typeface="Menlo" panose="020B0609030804020204" pitchFamily="49" charset="0"/>
-              </a:rPr>
-              <a:t> </a:t>
-            </a:r>
-            <a:r>
-              <a:rPr lang="en-US" dirty="0" err="1">
-                <a:solidFill>
-                  <a:srgbClr val="0000FF"/>
-                </a:solidFill>
-                <a:latin typeface="Menlo" panose="020B0609030804020204" pitchFamily="49" charset="0"/>
-              </a:rPr>
-              <a:t>IdInt</a:t>
-            </a:r>
-            <a:r>
-              <a:rPr lang="en-US" dirty="0">
-                <a:solidFill>
-                  <a:srgbClr val="000000"/>
-                </a:solidFill>
-                <a:latin typeface="Menlo" panose="020B0609030804020204" pitchFamily="49" charset="0"/>
-              </a:rPr>
-              <a:t>,</a:t>
-            </a:r>
-          </a:p>
-          <a:p>
-            <a:pPr marL="0" indent="0">
-              <a:buNone/>
-            </a:pPr>
-            <a:r>
-              <a:rPr lang="en-US" dirty="0">
-                <a:solidFill>
-                  <a:srgbClr val="001080"/>
-                </a:solidFill>
-                <a:latin typeface="Menlo" panose="020B0609030804020204" pitchFamily="49" charset="0"/>
-              </a:rPr>
-              <a:t>    </a:t>
-            </a:r>
-            <a:r>
-              <a:rPr lang="en-US" dirty="0" err="1">
-                <a:solidFill>
-                  <a:srgbClr val="001080"/>
-                </a:solidFill>
-                <a:latin typeface="Menlo" panose="020B0609030804020204" pitchFamily="49" charset="0"/>
-              </a:rPr>
-              <a:t>impl_nf</a:t>
-            </a:r>
-            <a:r>
-              <a:rPr lang="en-US" dirty="0">
-                <a:solidFill>
-                  <a:srgbClr val="000000"/>
-                </a:solidFill>
-                <a:latin typeface="Menlo" panose="020B0609030804020204" pitchFamily="49" charset="0"/>
-              </a:rPr>
-              <a:t> :: </a:t>
-            </a:r>
-            <a:r>
-              <a:rPr lang="en-US" dirty="0">
-                <a:solidFill>
-                  <a:srgbClr val="001080"/>
-                </a:solidFill>
-                <a:latin typeface="Menlo" panose="020B0609030804020204" pitchFamily="49" charset="0"/>
-              </a:rPr>
-              <a:t>a</a:t>
-            </a:r>
-            <a:r>
-              <a:rPr lang="en-US" dirty="0">
-                <a:solidFill>
-                  <a:srgbClr val="000000"/>
-                </a:solidFill>
-                <a:latin typeface="Menlo" panose="020B0609030804020204" pitchFamily="49" charset="0"/>
-              </a:rPr>
-              <a:t> -&gt; </a:t>
-            </a:r>
-            <a:r>
-              <a:rPr lang="en-US" dirty="0">
-                <a:solidFill>
-                  <a:srgbClr val="001080"/>
-                </a:solidFill>
-                <a:latin typeface="Menlo" panose="020B0609030804020204" pitchFamily="49" charset="0"/>
-              </a:rPr>
-              <a:t>a</a:t>
-            </a:r>
-            <a:r>
-              <a:rPr lang="en-US" dirty="0">
-                <a:solidFill>
-                  <a:srgbClr val="000000"/>
-                </a:solidFill>
-                <a:latin typeface="Menlo" panose="020B0609030804020204" pitchFamily="49" charset="0"/>
-              </a:rPr>
-              <a:t>,</a:t>
-            </a:r>
-          </a:p>
-          <a:p>
-            <a:pPr marL="0" indent="0">
-              <a:buNone/>
-            </a:pPr>
-            <a:r>
-              <a:rPr lang="en-US" dirty="0">
-                <a:solidFill>
-                  <a:srgbClr val="001080"/>
-                </a:solidFill>
-                <a:latin typeface="Menlo" panose="020B0609030804020204" pitchFamily="49" charset="0"/>
-              </a:rPr>
-              <a:t>    </a:t>
-            </a:r>
-            <a:r>
-              <a:rPr lang="en-US" dirty="0" err="1">
-                <a:solidFill>
-                  <a:srgbClr val="001080"/>
-                </a:solidFill>
-                <a:latin typeface="Menlo" panose="020B0609030804020204" pitchFamily="49" charset="0"/>
-              </a:rPr>
-              <a:t>impl_aeq</a:t>
-            </a:r>
-            <a:r>
-              <a:rPr lang="en-US" dirty="0">
-                <a:solidFill>
-                  <a:srgbClr val="000000"/>
-                </a:solidFill>
-                <a:latin typeface="Menlo" panose="020B0609030804020204" pitchFamily="49" charset="0"/>
-              </a:rPr>
-              <a:t> :: </a:t>
-            </a:r>
-            <a:r>
-              <a:rPr lang="en-US" dirty="0">
-                <a:solidFill>
-                  <a:srgbClr val="001080"/>
-                </a:solidFill>
-                <a:latin typeface="Menlo" panose="020B0609030804020204" pitchFamily="49" charset="0"/>
-              </a:rPr>
-              <a:t>a</a:t>
-            </a:r>
-            <a:r>
-              <a:rPr lang="en-US" dirty="0">
-                <a:solidFill>
-                  <a:srgbClr val="000000"/>
-                </a:solidFill>
-                <a:latin typeface="Menlo" panose="020B0609030804020204" pitchFamily="49" charset="0"/>
-              </a:rPr>
-              <a:t> -&gt; </a:t>
-            </a:r>
-            <a:r>
-              <a:rPr lang="en-US" dirty="0">
-                <a:solidFill>
-                  <a:srgbClr val="001080"/>
-                </a:solidFill>
-                <a:latin typeface="Menlo" panose="020B0609030804020204" pitchFamily="49" charset="0"/>
-              </a:rPr>
-              <a:t>a</a:t>
-            </a:r>
-            <a:r>
-              <a:rPr lang="en-US" dirty="0">
-                <a:solidFill>
-                  <a:srgbClr val="000000"/>
-                </a:solidFill>
-                <a:latin typeface="Menlo" panose="020B0609030804020204" pitchFamily="49" charset="0"/>
-              </a:rPr>
-              <a:t> -&gt; </a:t>
-            </a:r>
-            <a:r>
-              <a:rPr lang="en-US" dirty="0">
-                <a:solidFill>
-                  <a:srgbClr val="0000FF"/>
-                </a:solidFill>
-                <a:latin typeface="Menlo" panose="020B0609030804020204" pitchFamily="49" charset="0"/>
-              </a:rPr>
-              <a:t>Bool</a:t>
-            </a:r>
-            <a:endParaRPr lang="en-US" dirty="0">
-              <a:solidFill>
-                <a:srgbClr val="000000"/>
-              </a:solidFill>
-              <a:latin typeface="Menlo" panose="020B0609030804020204" pitchFamily="49" charset="0"/>
-            </a:endParaRPr>
-          </a:p>
-          <a:p>
-            <a:pPr marL="0" indent="0">
-              <a:buNone/>
-            </a:pPr>
-            <a:r>
-              <a:rPr lang="en-US" dirty="0">
-                <a:solidFill>
-                  <a:srgbClr val="000000"/>
-                </a:solidFill>
-                <a:latin typeface="Menlo" panose="020B0609030804020204" pitchFamily="49" charset="0"/>
-              </a:rPr>
-              <a:t>  }</a:t>
-            </a:r>
-          </a:p>
-          <a:p>
-            <a:pPr marL="0" indent="0">
-              <a:buNone/>
-            </a:pPr>
-            <a:br>
-              <a:rPr lang="en-US" dirty="0">
-                <a:solidFill>
-                  <a:srgbClr val="000000"/>
-                </a:solidFill>
-                <a:latin typeface="Menlo" panose="020B0609030804020204" pitchFamily="49" charset="0"/>
-              </a:rPr>
-            </a:br>
-            <a:endParaRPr lang="en-US" dirty="0">
-              <a:solidFill>
-                <a:srgbClr val="000000"/>
-              </a:solidFill>
-              <a:latin typeface="Menlo" panose="020B0609030804020204" pitchFamily="49" charset="0"/>
-            </a:endParaRPr>
-          </a:p>
-          <a:p>
-            <a:endParaRPr lang="en-US" dirty="0"/>
-          </a:p>
-        </p:txBody>
-      </p:sp>
-    </p:spTree>
-    <p:extLst>
-      <p:ext uri="{BB962C8B-B14F-4D97-AF65-F5344CB8AC3E}">
-        <p14:creationId xmlns:p14="http://schemas.microsoft.com/office/powerpoint/2010/main" val="726298518"/>
-      </p:ext>
-    </p:extLst>
-  </p:cSld>
-  <p:clrMapOvr>
-    <a:masterClrMapping/>
-  </p:clrMapOvr>
-</p:sld>
-</file>
-
-<file path=ppt/slides/slide11.xml><?xml version="1.0" encoding="utf-8"?>
 <p:sld xmlns:a="http://schemas.openxmlformats.org/drawingml/2006/main" xmlns:r="http://schemas.openxmlformats.org/officeDocument/2006/relationships" xmlns:p="http://schemas.openxmlformats.org/presentationml/2006/main">
   <p:cSld>
     <p:spTree>
@@ -10146,6 +9566,186 @@
     <p:extLst>
       <p:ext uri="{BB962C8B-B14F-4D97-AF65-F5344CB8AC3E}">
         <p14:creationId xmlns:p14="http://schemas.microsoft.com/office/powerpoint/2010/main" val="2690615864"/>
+      </p:ext>
+    </p:extLst>
+  </p:cSld>
+  <p:clrMapOvr>
+    <a:masterClrMapping/>
+  </p:clrMapOvr>
+</p:sld>
+</file>
+
+<file path=ppt/slides/slide11.xml><?xml version="1.0" encoding="utf-8"?>
+<p:sld xmlns:a="http://schemas.openxmlformats.org/drawingml/2006/main" xmlns:r="http://schemas.openxmlformats.org/officeDocument/2006/relationships" xmlns:p="http://schemas.openxmlformats.org/presentationml/2006/main">
+  <p:cSld>
+    <p:spTree>
+      <p:nvGrpSpPr>
+        <p:cNvPr id="1" name=""/>
+        <p:cNvGrpSpPr/>
+        <p:nvPr/>
+      </p:nvGrpSpPr>
+      <p:grpSpPr>
+        <a:xfrm>
+          <a:off x="0" y="0"/>
+          <a:ext cx="0" cy="0"/>
+          <a:chOff x="0" y="0"/>
+          <a:chExt cx="0" cy="0"/>
+        </a:xfrm>
+      </p:grpSpPr>
+      <p:sp>
+        <p:nvSpPr>
+          <p:cNvPr id="2" name="Title 1">
+            <a:extLst>
+              <a:ext uri="{FF2B5EF4-FFF2-40B4-BE49-F238E27FC236}">
+                <a16:creationId xmlns:a16="http://schemas.microsoft.com/office/drawing/2014/main" id="{9011FA07-ECDF-1C4C-AE1B-E06E6DA68DAD}"/>
+              </a:ext>
+            </a:extLst>
+          </p:cNvPr>
+          <p:cNvSpPr>
+            <a:spLocks noGrp="1"/>
+          </p:cNvSpPr>
+          <p:nvPr>
+            <p:ph type="title"/>
+          </p:nvPr>
+        </p:nvSpPr>
+        <p:spPr/>
+        <p:txBody>
+          <a:bodyPr/>
+          <a:lstStyle/>
+          <a:p>
+            <a:r>
+              <a:rPr lang="en-US" dirty="0"/>
+              <a:t>Benchmark Platform</a:t>
+            </a:r>
+          </a:p>
+        </p:txBody>
+      </p:sp>
+      <p:sp>
+        <p:nvSpPr>
+          <p:cNvPr id="4" name="Content Placeholder 3">
+            <a:extLst>
+              <a:ext uri="{FF2B5EF4-FFF2-40B4-BE49-F238E27FC236}">
+                <a16:creationId xmlns:a16="http://schemas.microsoft.com/office/drawing/2014/main" id="{0BFC8706-317E-DA40-BB56-1FD4915DD138}"/>
+              </a:ext>
+            </a:extLst>
+          </p:cNvPr>
+          <p:cNvSpPr txBox="1">
+            <a:spLocks noGrp="1"/>
+          </p:cNvSpPr>
+          <p:nvPr>
+            <p:ph idx="1"/>
+          </p:nvPr>
+        </p:nvSpPr>
+        <p:spPr>
+          <a:xfrm>
+            <a:off x="838200" y="1690688"/>
+            <a:ext cx="10515600" cy="4684359"/>
+          </a:xfrm>
+          <a:prstGeom prst="rect">
+            <a:avLst/>
+          </a:prstGeom>
+          <a:noFill/>
+        </p:spPr>
+        <p:txBody>
+          <a:bodyPr wrap="square" rtlCol="0">
+            <a:spAutoFit/>
+          </a:bodyPr>
+          <a:lstStyle/>
+          <a:p>
+            <a:r>
+              <a:rPr lang="en-US" dirty="0">
+                <a:hlinkClick r:id="rId2"/>
+              </a:rPr>
+              <a:t>https://github.com/sweirich/lambda-n-ways/</a:t>
+            </a:r>
+            <a:endParaRPr lang="en-US" dirty="0"/>
+          </a:p>
+          <a:p>
+            <a:r>
+              <a:rPr lang="en-US" dirty="0"/>
+              <a:t>Forked from Lennart </a:t>
+            </a:r>
+            <a:r>
+              <a:rPr lang="en-US" dirty="0" err="1"/>
+              <a:t>Augustsson's</a:t>
+            </a:r>
+            <a:r>
+              <a:rPr lang="en-US" dirty="0"/>
+              <a:t> Lambda-Calculus Four Ways</a:t>
+            </a:r>
+          </a:p>
+          <a:p>
+            <a:pPr lvl="1"/>
+            <a:r>
+              <a:rPr lang="en-US" dirty="0" err="1"/>
+              <a:t>DeBruijn</a:t>
+            </a:r>
+            <a:r>
+              <a:rPr lang="en-US" dirty="0"/>
+              <a:t> indices</a:t>
+            </a:r>
+          </a:p>
+          <a:p>
+            <a:pPr lvl="1"/>
+            <a:r>
+              <a:rPr lang="en-US" dirty="0"/>
+              <a:t>Named (rename to avoid capture)</a:t>
+            </a:r>
+          </a:p>
+          <a:p>
+            <a:pPr lvl="1"/>
+            <a:r>
+              <a:rPr lang="en-US" dirty="0"/>
+              <a:t>Named (globally unique) </a:t>
+            </a:r>
+          </a:p>
+          <a:p>
+            <a:pPr lvl="1"/>
+            <a:r>
+              <a:rPr lang="en-US" dirty="0"/>
+              <a:t>HOAS</a:t>
+            </a:r>
+          </a:p>
+          <a:p>
+            <a:r>
+              <a:rPr lang="en-US" dirty="0"/>
+              <a:t>Common interface</a:t>
+            </a:r>
+          </a:p>
+          <a:p>
+            <a:pPr lvl="1"/>
+            <a:r>
+              <a:rPr lang="en-US" dirty="0"/>
+              <a:t>Representation of untyped lambda-calculus</a:t>
+            </a:r>
+          </a:p>
+          <a:p>
+            <a:pPr lvl="1"/>
+            <a:r>
+              <a:rPr lang="en-US" dirty="0"/>
+              <a:t>Conversion to/from string representation</a:t>
+            </a:r>
+          </a:p>
+          <a:p>
+            <a:pPr lvl="1"/>
+            <a:r>
+              <a:rPr lang="en-US" dirty="0"/>
+              <a:t>Alpha-equivalence</a:t>
+            </a:r>
+          </a:p>
+          <a:p>
+            <a:pPr lvl="1"/>
+            <a:r>
+              <a:rPr lang="en-US" dirty="0"/>
+              <a:t>Full normalization (based on substitution)</a:t>
+            </a:r>
+          </a:p>
+        </p:txBody>
+      </p:sp>
+    </p:spTree>
+    <p:extLst>
+      <p:ext uri="{BB962C8B-B14F-4D97-AF65-F5344CB8AC3E}">
+        <p14:creationId xmlns:p14="http://schemas.microsoft.com/office/powerpoint/2010/main" val="2171200798"/>
       </p:ext>
     </p:extLst>
   </p:cSld>
@@ -13495,23 +13095,8 @@
                 </a:solidFill>
                 <a:latin typeface="Menlo" panose="020B0609030804020204" pitchFamily="49" charset="0"/>
               </a:rPr>
-              <a:t>== free variable </a:t>
-            </a:r>
-            <a:r>
-              <a:rPr lang="en-US" sz="2000" dirty="0" err="1">
-                <a:solidFill>
-                  <a:schemeClr val="accent6"/>
-                </a:solidFill>
-                <a:latin typeface="Menlo" panose="020B0609030804020204" pitchFamily="49" charset="0"/>
-              </a:rPr>
-              <a:t>substituion</a:t>
-            </a:r>
-            <a:endParaRPr lang="en-US" sz="2000" dirty="0">
-              <a:solidFill>
-                <a:schemeClr val="accent6"/>
-              </a:solidFill>
-              <a:latin typeface="Menlo" panose="020B0609030804020204" pitchFamily="49" charset="0"/>
-            </a:endParaRPr>
+              <a:t>== free variable substitution</a:t>
+            </a:r>
           </a:p>
           <a:p>
             <a:pPr marL="0" indent="0">
@@ -13765,733 +13350,6 @@
           <p:cNvPr id="2" name="Title 1">
             <a:extLst>
               <a:ext uri="{FF2B5EF4-FFF2-40B4-BE49-F238E27FC236}">
-                <a16:creationId xmlns:a16="http://schemas.microsoft.com/office/drawing/2014/main" id="{F8A82A16-C2E0-F44B-B173-6A53DBB62D99}"/>
-              </a:ext>
-            </a:extLst>
-          </p:cNvPr>
-          <p:cNvSpPr>
-            <a:spLocks noGrp="1"/>
-          </p:cNvSpPr>
-          <p:nvPr>
-            <p:ph type="title"/>
-          </p:nvPr>
-        </p:nvSpPr>
-        <p:spPr>
-          <a:xfrm>
-            <a:off x="500203" y="320677"/>
-            <a:ext cx="10942380" cy="1087060"/>
-          </a:xfrm>
-        </p:spPr>
-        <p:txBody>
-          <a:bodyPr>
-            <a:normAutofit/>
-          </a:bodyPr>
-          <a:lstStyle/>
-          <a:p>
-            <a:r>
-              <a:rPr lang="en-US" dirty="0"/>
-              <a:t>Reduction w/ locally nameless terms</a:t>
-            </a:r>
-          </a:p>
-        </p:txBody>
-      </p:sp>
-      <p:sp>
-        <p:nvSpPr>
-          <p:cNvPr id="3" name="Content Placeholder 2">
-            <a:extLst>
-              <a:ext uri="{FF2B5EF4-FFF2-40B4-BE49-F238E27FC236}">
-                <a16:creationId xmlns:a16="http://schemas.microsoft.com/office/drawing/2014/main" id="{CA4DC282-9CD0-9D44-9D0B-D233CDEF34F5}"/>
-              </a:ext>
-            </a:extLst>
-          </p:cNvPr>
-          <p:cNvSpPr>
-            <a:spLocks noGrp="1"/>
-          </p:cNvSpPr>
-          <p:nvPr>
-            <p:ph idx="1"/>
-          </p:nvPr>
-        </p:nvSpPr>
-        <p:spPr>
-          <a:xfrm>
-            <a:off x="626712" y="1407737"/>
-            <a:ext cx="9932729" cy="4618399"/>
-          </a:xfrm>
-        </p:spPr>
-        <p:txBody>
-          <a:bodyPr/>
-          <a:lstStyle/>
-          <a:p>
-            <a:pPr marL="0" indent="0">
-              <a:buNone/>
-            </a:pPr>
-            <a:r>
-              <a:rPr lang="en-US" sz="2000" dirty="0" err="1">
-                <a:solidFill>
-                  <a:srgbClr val="795E26"/>
-                </a:solidFill>
-                <a:latin typeface="Menlo" panose="020B0609030804020204" pitchFamily="49" charset="0"/>
-              </a:rPr>
-              <a:t>nfd</a:t>
-            </a:r>
-            <a:r>
-              <a:rPr lang="en-US" sz="2000" dirty="0">
-                <a:solidFill>
-                  <a:srgbClr val="000000"/>
-                </a:solidFill>
-                <a:latin typeface="Menlo" panose="020B0609030804020204" pitchFamily="49" charset="0"/>
-              </a:rPr>
-              <a:t> :: </a:t>
-            </a:r>
-            <a:r>
-              <a:rPr lang="en-US" sz="2000" dirty="0">
-                <a:solidFill>
-                  <a:srgbClr val="0000FF"/>
-                </a:solidFill>
-                <a:latin typeface="Menlo" panose="020B0609030804020204" pitchFamily="49" charset="0"/>
-              </a:rPr>
-              <a:t>Exp</a:t>
-            </a:r>
-            <a:r>
-              <a:rPr lang="en-US" sz="2000" dirty="0">
-                <a:solidFill>
-                  <a:srgbClr val="000000"/>
-                </a:solidFill>
-                <a:latin typeface="Menlo" panose="020B0609030804020204" pitchFamily="49" charset="0"/>
-              </a:rPr>
-              <a:t> -&gt; </a:t>
-            </a:r>
-            <a:r>
-              <a:rPr lang="en-US" sz="2000" dirty="0" err="1">
-                <a:solidFill>
-                  <a:srgbClr val="0000FF"/>
-                </a:solidFill>
-                <a:latin typeface="Menlo" panose="020B0609030804020204" pitchFamily="49" charset="0"/>
-              </a:rPr>
-              <a:t>FreshM</a:t>
-            </a:r>
-            <a:r>
-              <a:rPr lang="en-US" sz="2000" dirty="0">
-                <a:solidFill>
-                  <a:srgbClr val="000000"/>
-                </a:solidFill>
-                <a:latin typeface="Menlo" panose="020B0609030804020204" pitchFamily="49" charset="0"/>
-              </a:rPr>
-              <a:t> </a:t>
-            </a:r>
-            <a:r>
-              <a:rPr lang="en-US" sz="2000" dirty="0">
-                <a:solidFill>
-                  <a:srgbClr val="0000FF"/>
-                </a:solidFill>
-                <a:latin typeface="Menlo" panose="020B0609030804020204" pitchFamily="49" charset="0"/>
-              </a:rPr>
-              <a:t>Exp</a:t>
-            </a:r>
-            <a:endParaRPr lang="en-US" sz="2000" dirty="0">
-              <a:solidFill>
-                <a:srgbClr val="000000"/>
-              </a:solidFill>
-              <a:latin typeface="Menlo" panose="020B0609030804020204" pitchFamily="49" charset="0"/>
-            </a:endParaRPr>
-          </a:p>
-          <a:p>
-            <a:pPr marL="0" indent="0">
-              <a:buNone/>
-            </a:pPr>
-            <a:r>
-              <a:rPr lang="en-US" sz="2000" dirty="0" err="1">
-                <a:solidFill>
-                  <a:srgbClr val="000000"/>
-                </a:solidFill>
-                <a:latin typeface="Menlo" panose="020B0609030804020204" pitchFamily="49" charset="0"/>
-              </a:rPr>
-              <a:t>nfd</a:t>
-            </a:r>
-            <a:r>
-              <a:rPr lang="en-US" sz="2000" dirty="0">
-                <a:solidFill>
-                  <a:srgbClr val="000000"/>
-                </a:solidFill>
-                <a:latin typeface="Menlo" panose="020B0609030804020204" pitchFamily="49" charset="0"/>
-              </a:rPr>
-              <a:t> (Var x) = return (Var x)</a:t>
-            </a:r>
-          </a:p>
-          <a:p>
-            <a:pPr marL="0" indent="0">
-              <a:buNone/>
-            </a:pPr>
-            <a:r>
-              <a:rPr lang="en-US" sz="2000" dirty="0" err="1">
-                <a:solidFill>
-                  <a:srgbClr val="000000"/>
-                </a:solidFill>
-                <a:latin typeface="Menlo" panose="020B0609030804020204" pitchFamily="49" charset="0"/>
-              </a:rPr>
-              <a:t>nfd</a:t>
-            </a:r>
-            <a:r>
-              <a:rPr lang="en-US" sz="2000" dirty="0">
-                <a:solidFill>
-                  <a:srgbClr val="000000"/>
-                </a:solidFill>
-                <a:latin typeface="Menlo" panose="020B0609030804020204" pitchFamily="49" charset="0"/>
-              </a:rPr>
-              <a:t> (Lam e) = </a:t>
-            </a:r>
-            <a:r>
-              <a:rPr lang="en-US" sz="2000" dirty="0">
-                <a:solidFill>
-                  <a:srgbClr val="AF00DB"/>
-                </a:solidFill>
-                <a:latin typeface="Menlo" panose="020B0609030804020204" pitchFamily="49" charset="0"/>
-              </a:rPr>
-              <a:t>do</a:t>
-            </a:r>
-            <a:endParaRPr lang="en-US" sz="2000" dirty="0">
-              <a:solidFill>
-                <a:srgbClr val="000000"/>
-              </a:solidFill>
-              <a:latin typeface="Menlo" panose="020B0609030804020204" pitchFamily="49" charset="0"/>
-            </a:endParaRPr>
-          </a:p>
-          <a:p>
-            <a:pPr marL="0" indent="0">
-              <a:buNone/>
-            </a:pPr>
-            <a:r>
-              <a:rPr lang="en-US" sz="2000" dirty="0">
-                <a:solidFill>
-                  <a:srgbClr val="000000"/>
-                </a:solidFill>
-                <a:latin typeface="Menlo" panose="020B0609030804020204" pitchFamily="49" charset="0"/>
-              </a:rPr>
-              <a:t>  (x, e') &lt;- unbind e</a:t>
-            </a:r>
-          </a:p>
-          <a:p>
-            <a:pPr marL="0" indent="0">
-              <a:buNone/>
-            </a:pPr>
-            <a:r>
-              <a:rPr lang="en-US" sz="2000" dirty="0">
-                <a:solidFill>
-                  <a:srgbClr val="000000"/>
-                </a:solidFill>
-                <a:latin typeface="Menlo" panose="020B0609030804020204" pitchFamily="49" charset="0"/>
-              </a:rPr>
-              <a:t>  e1 &lt;- </a:t>
-            </a:r>
-            <a:r>
-              <a:rPr lang="en-US" sz="2000" dirty="0" err="1">
-                <a:solidFill>
-                  <a:srgbClr val="000000"/>
-                </a:solidFill>
-                <a:latin typeface="Menlo" panose="020B0609030804020204" pitchFamily="49" charset="0"/>
-              </a:rPr>
-              <a:t>nfd</a:t>
-            </a:r>
-            <a:r>
-              <a:rPr lang="en-US" sz="2000" dirty="0">
-                <a:solidFill>
-                  <a:srgbClr val="000000"/>
-                </a:solidFill>
-                <a:latin typeface="Menlo" panose="020B0609030804020204" pitchFamily="49" charset="0"/>
-              </a:rPr>
-              <a:t> e'</a:t>
-            </a:r>
-          </a:p>
-          <a:p>
-            <a:pPr marL="0" indent="0">
-              <a:buNone/>
-            </a:pPr>
-            <a:r>
-              <a:rPr lang="en-US" sz="2000" dirty="0">
-                <a:solidFill>
-                  <a:srgbClr val="000000"/>
-                </a:solidFill>
-                <a:latin typeface="Menlo" panose="020B0609030804020204" pitchFamily="49" charset="0"/>
-              </a:rPr>
-              <a:t>  return $ Lam (bind x e1)</a:t>
-            </a:r>
-          </a:p>
-          <a:p>
-            <a:pPr marL="0" indent="0">
-              <a:buNone/>
-            </a:pPr>
-            <a:r>
-              <a:rPr lang="en-US" sz="2000" dirty="0" err="1">
-                <a:solidFill>
-                  <a:srgbClr val="000000"/>
-                </a:solidFill>
-                <a:latin typeface="Menlo" panose="020B0609030804020204" pitchFamily="49" charset="0"/>
-              </a:rPr>
-              <a:t>nfd</a:t>
-            </a:r>
-            <a:r>
-              <a:rPr lang="en-US" sz="2000" dirty="0">
-                <a:solidFill>
-                  <a:srgbClr val="000000"/>
-                </a:solidFill>
-                <a:latin typeface="Menlo" panose="020B0609030804020204" pitchFamily="49" charset="0"/>
-              </a:rPr>
-              <a:t> (App f a) = </a:t>
-            </a:r>
-            <a:r>
-              <a:rPr lang="en-US" sz="2000" dirty="0">
-                <a:solidFill>
-                  <a:srgbClr val="AF00DB"/>
-                </a:solidFill>
-                <a:latin typeface="Menlo" panose="020B0609030804020204" pitchFamily="49" charset="0"/>
-              </a:rPr>
-              <a:t>do</a:t>
-            </a:r>
-            <a:endParaRPr lang="en-US" sz="2000" dirty="0">
-              <a:solidFill>
-                <a:srgbClr val="000000"/>
-              </a:solidFill>
-              <a:latin typeface="Menlo" panose="020B0609030804020204" pitchFamily="49" charset="0"/>
-            </a:endParaRPr>
-          </a:p>
-          <a:p>
-            <a:pPr marL="0" indent="0">
-              <a:buNone/>
-            </a:pPr>
-            <a:r>
-              <a:rPr lang="en-US" sz="2000" dirty="0">
-                <a:solidFill>
-                  <a:srgbClr val="000000"/>
-                </a:solidFill>
-                <a:latin typeface="Menlo" panose="020B0609030804020204" pitchFamily="49" charset="0"/>
-              </a:rPr>
-              <a:t>  f' &lt;- </a:t>
-            </a:r>
-            <a:r>
-              <a:rPr lang="en-US" sz="2000" dirty="0" err="1">
-                <a:solidFill>
-                  <a:srgbClr val="000000"/>
-                </a:solidFill>
-                <a:latin typeface="Menlo" panose="020B0609030804020204" pitchFamily="49" charset="0"/>
-              </a:rPr>
-              <a:t>whnf</a:t>
-            </a:r>
-            <a:r>
-              <a:rPr lang="en-US" sz="2000" dirty="0">
-                <a:solidFill>
-                  <a:srgbClr val="000000"/>
-                </a:solidFill>
-                <a:latin typeface="Menlo" panose="020B0609030804020204" pitchFamily="49" charset="0"/>
-              </a:rPr>
-              <a:t> f</a:t>
-            </a:r>
-          </a:p>
-          <a:p>
-            <a:pPr marL="0" indent="0">
-              <a:buNone/>
-            </a:pPr>
-            <a:r>
-              <a:rPr lang="en-US" sz="2000" dirty="0">
-                <a:solidFill>
-                  <a:srgbClr val="AF00DB"/>
-                </a:solidFill>
-                <a:latin typeface="Menlo" panose="020B0609030804020204" pitchFamily="49" charset="0"/>
-              </a:rPr>
-              <a:t>case</a:t>
-            </a:r>
-            <a:r>
-              <a:rPr lang="en-US" sz="2000" dirty="0">
-                <a:solidFill>
-                  <a:srgbClr val="000000"/>
-                </a:solidFill>
-                <a:latin typeface="Menlo" panose="020B0609030804020204" pitchFamily="49" charset="0"/>
-              </a:rPr>
-              <a:t> f' </a:t>
-            </a:r>
-            <a:r>
-              <a:rPr lang="en-US" sz="2000" dirty="0">
-                <a:solidFill>
-                  <a:srgbClr val="AF00DB"/>
-                </a:solidFill>
-                <a:latin typeface="Menlo" panose="020B0609030804020204" pitchFamily="49" charset="0"/>
-              </a:rPr>
-              <a:t>of</a:t>
-            </a:r>
-            <a:endParaRPr lang="en-US" sz="2000" dirty="0">
-              <a:solidFill>
-                <a:srgbClr val="000000"/>
-              </a:solidFill>
-              <a:latin typeface="Menlo" panose="020B0609030804020204" pitchFamily="49" charset="0"/>
-            </a:endParaRPr>
-          </a:p>
-          <a:p>
-            <a:pPr marL="0" indent="0">
-              <a:buNone/>
-            </a:pPr>
-            <a:r>
-              <a:rPr lang="en-US" sz="2000" dirty="0">
-                <a:solidFill>
-                  <a:srgbClr val="000000"/>
-                </a:solidFill>
-                <a:latin typeface="Menlo" panose="020B0609030804020204" pitchFamily="49" charset="0"/>
-              </a:rPr>
-              <a:t>  Lam b -&gt; </a:t>
-            </a:r>
-            <a:r>
-              <a:rPr lang="en-US" sz="2000" dirty="0">
-                <a:solidFill>
-                  <a:srgbClr val="AF00DB"/>
-                </a:solidFill>
-                <a:latin typeface="Menlo" panose="020B0609030804020204" pitchFamily="49" charset="0"/>
-              </a:rPr>
-              <a:t>do</a:t>
-            </a:r>
-            <a:endParaRPr lang="en-US" sz="2000" dirty="0">
-              <a:solidFill>
-                <a:srgbClr val="000000"/>
-              </a:solidFill>
-              <a:latin typeface="Menlo" panose="020B0609030804020204" pitchFamily="49" charset="0"/>
-            </a:endParaRPr>
-          </a:p>
-          <a:p>
-            <a:pPr marL="0" indent="0">
-              <a:buNone/>
-            </a:pPr>
-            <a:r>
-              <a:rPr lang="en-US" sz="2000" dirty="0">
-                <a:solidFill>
-                  <a:srgbClr val="000000"/>
-                </a:solidFill>
-                <a:latin typeface="Menlo" panose="020B0609030804020204" pitchFamily="49" charset="0"/>
-              </a:rPr>
-              <a:t>    </a:t>
-            </a:r>
-            <a:r>
-              <a:rPr lang="en-US" sz="2000" dirty="0" err="1">
-                <a:solidFill>
-                  <a:srgbClr val="000000"/>
-                </a:solidFill>
-                <a:latin typeface="Menlo" panose="020B0609030804020204" pitchFamily="49" charset="0"/>
-              </a:rPr>
-              <a:t>nfd</a:t>
-            </a:r>
-            <a:r>
-              <a:rPr lang="en-US" sz="2000" dirty="0">
-                <a:solidFill>
-                  <a:srgbClr val="000000"/>
-                </a:solidFill>
-                <a:latin typeface="Menlo" panose="020B0609030804020204" pitchFamily="49" charset="0"/>
-              </a:rPr>
-              <a:t> (</a:t>
-            </a:r>
-            <a:r>
-              <a:rPr lang="en-US" sz="2000" b="1" dirty="0">
-                <a:solidFill>
-                  <a:srgbClr val="000000"/>
-                </a:solidFill>
-                <a:latin typeface="Menlo" panose="020B0609030804020204" pitchFamily="49" charset="0"/>
-              </a:rPr>
-              <a:t>instantiate</a:t>
-            </a:r>
-            <a:r>
-              <a:rPr lang="en-US" sz="2000" dirty="0">
-                <a:solidFill>
-                  <a:srgbClr val="000000"/>
-                </a:solidFill>
-                <a:latin typeface="Menlo" panose="020B0609030804020204" pitchFamily="49" charset="0"/>
-              </a:rPr>
-              <a:t> a b)      </a:t>
-            </a:r>
-            <a:r>
-              <a:rPr lang="en-US" sz="2000" dirty="0">
-                <a:solidFill>
-                  <a:schemeClr val="accent6"/>
-                </a:solidFill>
-                <a:latin typeface="Menlo" panose="020B0609030804020204" pitchFamily="49" charset="0"/>
-              </a:rPr>
-              <a:t>-- bound variable substitution</a:t>
-            </a:r>
-          </a:p>
-          <a:p>
-            <a:pPr marL="0" indent="0">
-              <a:buNone/>
-            </a:pPr>
-            <a:r>
-              <a:rPr lang="en-US" sz="2000" dirty="0">
-                <a:solidFill>
-                  <a:schemeClr val="accent6"/>
-                </a:solidFill>
-                <a:latin typeface="Menlo" panose="020B0609030804020204" pitchFamily="49" charset="0"/>
-              </a:rPr>
-              <a:t>                               -- (can be </a:t>
-            </a:r>
-            <a:r>
-              <a:rPr lang="en-US" sz="2000">
-                <a:solidFill>
-                  <a:schemeClr val="accent6"/>
-                </a:solidFill>
-                <a:latin typeface="Menlo" panose="020B0609030804020204" pitchFamily="49" charset="0"/>
-              </a:rPr>
-              <a:t>defined generically)</a:t>
-            </a:r>
-            <a:endParaRPr lang="en-US" sz="2000" dirty="0">
-              <a:solidFill>
-                <a:schemeClr val="accent6"/>
-              </a:solidFill>
-              <a:latin typeface="Menlo" panose="020B0609030804020204" pitchFamily="49" charset="0"/>
-            </a:endParaRPr>
-          </a:p>
-          <a:p>
-            <a:pPr marL="0" indent="0">
-              <a:buNone/>
-            </a:pPr>
-            <a:r>
-              <a:rPr lang="en-US" sz="2000" dirty="0">
-                <a:solidFill>
-                  <a:srgbClr val="000000"/>
-                </a:solidFill>
-                <a:latin typeface="Menlo" panose="020B0609030804020204" pitchFamily="49" charset="0"/>
-              </a:rPr>
-              <a:t>_ -&gt; App &lt;$&gt; </a:t>
-            </a:r>
-            <a:r>
-              <a:rPr lang="en-US" sz="2000" dirty="0" err="1">
-                <a:solidFill>
-                  <a:srgbClr val="000000"/>
-                </a:solidFill>
-                <a:latin typeface="Menlo" panose="020B0609030804020204" pitchFamily="49" charset="0"/>
-              </a:rPr>
-              <a:t>nfd</a:t>
-            </a:r>
-            <a:r>
-              <a:rPr lang="en-US" sz="2000" dirty="0">
-                <a:solidFill>
-                  <a:srgbClr val="000000"/>
-                </a:solidFill>
-                <a:latin typeface="Menlo" panose="020B0609030804020204" pitchFamily="49" charset="0"/>
-              </a:rPr>
-              <a:t> f' &lt;*&gt; </a:t>
-            </a:r>
-            <a:r>
-              <a:rPr lang="en-US" sz="2000" dirty="0" err="1">
-                <a:solidFill>
-                  <a:srgbClr val="000000"/>
-                </a:solidFill>
-                <a:latin typeface="Menlo" panose="020B0609030804020204" pitchFamily="49" charset="0"/>
-              </a:rPr>
-              <a:t>nfd</a:t>
-            </a:r>
-            <a:r>
-              <a:rPr lang="en-US" sz="2000" dirty="0">
-                <a:solidFill>
-                  <a:srgbClr val="000000"/>
-                </a:solidFill>
-                <a:latin typeface="Menlo" panose="020B0609030804020204" pitchFamily="49" charset="0"/>
-              </a:rPr>
-              <a:t> a</a:t>
-            </a:r>
-          </a:p>
-          <a:p>
-            <a:pPr marL="0" indent="0">
-              <a:buNone/>
-            </a:pPr>
-            <a:endParaRPr lang="en-US" sz="2400" dirty="0">
-              <a:latin typeface="Menlo" panose="020B0609030804020204" pitchFamily="49" charset="0"/>
-              <a:ea typeface="Menlo" panose="020B0609030804020204" pitchFamily="49" charset="0"/>
-              <a:cs typeface="Menlo" panose="020B0609030804020204" pitchFamily="49" charset="0"/>
-            </a:endParaRPr>
-          </a:p>
-          <a:p>
-            <a:pPr marL="0" indent="0">
-              <a:buNone/>
-            </a:pPr>
-            <a:r>
-              <a:rPr lang="en-US" sz="2400" dirty="0">
-                <a:latin typeface="Menlo" panose="020B0609030804020204" pitchFamily="49" charset="0"/>
-                <a:ea typeface="Menlo" panose="020B0609030804020204" pitchFamily="49" charset="0"/>
-                <a:cs typeface="Menlo" panose="020B0609030804020204" pitchFamily="49" charset="0"/>
-              </a:rPr>
-              <a:t>    </a:t>
-            </a:r>
-            <a:br>
-              <a:rPr lang="en-US" dirty="0"/>
-            </a:br>
-            <a:endParaRPr lang="en-US" dirty="0"/>
-          </a:p>
-        </p:txBody>
-      </p:sp>
-      <p:sp>
-        <p:nvSpPr>
-          <p:cNvPr id="4" name="TextBox 3">
-            <a:extLst>
-              <a:ext uri="{FF2B5EF4-FFF2-40B4-BE49-F238E27FC236}">
-                <a16:creationId xmlns:a16="http://schemas.microsoft.com/office/drawing/2014/main" id="{358C299E-AD14-1645-BD36-AA8FAF7A7F38}"/>
-              </a:ext>
-            </a:extLst>
-          </p:cNvPr>
-          <p:cNvSpPr txBox="1"/>
-          <p:nvPr/>
-        </p:nvSpPr>
-        <p:spPr>
-          <a:xfrm>
-            <a:off x="6576091" y="1407737"/>
-            <a:ext cx="3262432" cy="954107"/>
-          </a:xfrm>
-          <a:prstGeom prst="rect">
-            <a:avLst/>
-          </a:prstGeom>
-          <a:noFill/>
-        </p:spPr>
-        <p:txBody>
-          <a:bodyPr wrap="none" rtlCol="0">
-            <a:spAutoFit/>
-          </a:bodyPr>
-          <a:lstStyle/>
-          <a:p>
-            <a:r>
-              <a:rPr lang="en-US" sz="2000" dirty="0" err="1">
-                <a:solidFill>
-                  <a:srgbClr val="795E26"/>
-                </a:solidFill>
-                <a:latin typeface="Menlo" panose="020B0609030804020204" pitchFamily="49" charset="0"/>
-              </a:rPr>
-              <a:t>nf</a:t>
-            </a:r>
-            <a:r>
-              <a:rPr lang="en-US" sz="2000" dirty="0">
-                <a:solidFill>
-                  <a:srgbClr val="000000"/>
-                </a:solidFill>
-                <a:latin typeface="Menlo" panose="020B0609030804020204" pitchFamily="49" charset="0"/>
-              </a:rPr>
-              <a:t> :: </a:t>
-            </a:r>
-            <a:r>
-              <a:rPr lang="en-US" sz="2000" dirty="0">
-                <a:solidFill>
-                  <a:srgbClr val="0000FF"/>
-                </a:solidFill>
-                <a:latin typeface="Menlo" panose="020B0609030804020204" pitchFamily="49" charset="0"/>
-              </a:rPr>
-              <a:t>Exp</a:t>
-            </a:r>
-            <a:r>
-              <a:rPr lang="en-US" sz="2000" dirty="0">
-                <a:solidFill>
-                  <a:srgbClr val="000000"/>
-                </a:solidFill>
-                <a:latin typeface="Menlo" panose="020B0609030804020204" pitchFamily="49" charset="0"/>
-              </a:rPr>
-              <a:t> -&gt; </a:t>
-            </a:r>
-            <a:r>
-              <a:rPr lang="en-US" sz="2000" dirty="0">
-                <a:solidFill>
-                  <a:srgbClr val="0000FF"/>
-                </a:solidFill>
-                <a:latin typeface="Menlo" panose="020B0609030804020204" pitchFamily="49" charset="0"/>
-              </a:rPr>
-              <a:t>Exp</a:t>
-            </a:r>
-            <a:endParaRPr lang="en-US" sz="2000" dirty="0">
-              <a:solidFill>
-                <a:srgbClr val="000000"/>
-              </a:solidFill>
-              <a:latin typeface="Menlo" panose="020B0609030804020204" pitchFamily="49" charset="0"/>
-            </a:endParaRPr>
-          </a:p>
-          <a:p>
-            <a:r>
-              <a:rPr lang="en-US" sz="2000" dirty="0" err="1">
-                <a:solidFill>
-                  <a:srgbClr val="000000"/>
-                </a:solidFill>
-                <a:latin typeface="Menlo" panose="020B0609030804020204" pitchFamily="49" charset="0"/>
-              </a:rPr>
-              <a:t>nf</a:t>
-            </a:r>
-            <a:r>
-              <a:rPr lang="en-US" sz="2000" dirty="0">
-                <a:solidFill>
-                  <a:srgbClr val="000000"/>
-                </a:solidFill>
-                <a:latin typeface="Menlo" panose="020B0609030804020204" pitchFamily="49" charset="0"/>
-              </a:rPr>
-              <a:t> = </a:t>
-            </a:r>
-            <a:r>
-              <a:rPr lang="en-US" sz="2000" dirty="0" err="1">
-                <a:solidFill>
-                  <a:srgbClr val="000000"/>
-                </a:solidFill>
-                <a:latin typeface="Menlo" panose="020B0609030804020204" pitchFamily="49" charset="0"/>
-              </a:rPr>
-              <a:t>runFreshM</a:t>
-            </a:r>
-            <a:r>
-              <a:rPr lang="en-US" sz="2000" dirty="0">
-                <a:solidFill>
-                  <a:srgbClr val="000000"/>
-                </a:solidFill>
-                <a:latin typeface="Menlo" panose="020B0609030804020204" pitchFamily="49" charset="0"/>
-              </a:rPr>
-              <a:t> . </a:t>
-            </a:r>
-            <a:r>
-              <a:rPr lang="en-US" sz="2000" dirty="0" err="1">
-                <a:solidFill>
-                  <a:srgbClr val="000000"/>
-                </a:solidFill>
-                <a:latin typeface="Menlo" panose="020B0609030804020204" pitchFamily="49" charset="0"/>
-              </a:rPr>
-              <a:t>nfd</a:t>
-            </a:r>
-            <a:endParaRPr lang="en-US" sz="2000" dirty="0">
-              <a:solidFill>
-                <a:srgbClr val="000000"/>
-              </a:solidFill>
-              <a:latin typeface="Menlo" panose="020B0609030804020204" pitchFamily="49" charset="0"/>
-            </a:endParaRPr>
-          </a:p>
-          <a:p>
-            <a:endParaRPr lang="en-US" sz="1600" dirty="0"/>
-          </a:p>
-        </p:txBody>
-      </p:sp>
-    </p:spTree>
-    <p:extLst>
-      <p:ext uri="{BB962C8B-B14F-4D97-AF65-F5344CB8AC3E}">
-        <p14:creationId xmlns:p14="http://schemas.microsoft.com/office/powerpoint/2010/main" val="1661429975"/>
-      </p:ext>
-    </p:extLst>
-  </p:cSld>
-  <p:clrMapOvr>
-    <a:masterClrMapping/>
-  </p:clrMapOvr>
-</p:sld>
-</file>
-
-<file path=ppt/slides/slide7.xml><?xml version="1.0" encoding="utf-8"?>
-<p:sld xmlns:a="http://schemas.openxmlformats.org/drawingml/2006/main" xmlns:r="http://schemas.openxmlformats.org/officeDocument/2006/relationships" xmlns:p="http://schemas.openxmlformats.org/presentationml/2006/main">
-  <p:cSld>
-    <p:spTree>
-      <p:nvGrpSpPr>
-        <p:cNvPr id="1" name=""/>
-        <p:cNvGrpSpPr/>
-        <p:nvPr/>
-      </p:nvGrpSpPr>
-      <p:grpSpPr>
-        <a:xfrm>
-          <a:off x="0" y="0"/>
-          <a:ext cx="0" cy="0"/>
-          <a:chOff x="0" y="0"/>
-          <a:chExt cx="0" cy="0"/>
-        </a:xfrm>
-      </p:grpSpPr>
-      <p:sp>
-        <p:nvSpPr>
-          <p:cNvPr id="2" name="Title 1">
-            <a:extLst>
-              <a:ext uri="{FF2B5EF4-FFF2-40B4-BE49-F238E27FC236}">
                 <a16:creationId xmlns:a16="http://schemas.microsoft.com/office/drawing/2014/main" id="{473064D2-3AED-0F4F-A937-F9054398E0E8}"/>
               </a:ext>
             </a:extLst>
@@ -14553,7 +13411,7 @@
 </p:sld>
 </file>
 
-<file path=ppt/slides/slide8.xml><?xml version="1.0" encoding="utf-8"?>
+<file path=ppt/slides/slide7.xml><?xml version="1.0" encoding="utf-8"?>
 <p:sld xmlns:a="http://schemas.openxmlformats.org/drawingml/2006/main" xmlns:r="http://schemas.openxmlformats.org/officeDocument/2006/relationships" xmlns:p="http://schemas.openxmlformats.org/presentationml/2006/main">
   <p:cSld>
     <p:spTree>
@@ -14860,6 +13718,718 @@
 </p:sld>
 </file>
 
+<file path=ppt/slides/slide8.xml><?xml version="1.0" encoding="utf-8"?>
+<p:sld xmlns:a="http://schemas.openxmlformats.org/drawingml/2006/main" xmlns:r="http://schemas.openxmlformats.org/officeDocument/2006/relationships" xmlns:p="http://schemas.openxmlformats.org/presentationml/2006/main">
+  <p:cSld>
+    <p:spTree>
+      <p:nvGrpSpPr>
+        <p:cNvPr id="1" name=""/>
+        <p:cNvGrpSpPr/>
+        <p:nvPr/>
+      </p:nvGrpSpPr>
+      <p:grpSpPr>
+        <a:xfrm>
+          <a:off x="0" y="0"/>
+          <a:ext cx="0" cy="0"/>
+          <a:chOff x="0" y="0"/>
+          <a:chExt cx="0" cy="0"/>
+        </a:xfrm>
+      </p:grpSpPr>
+      <p:sp>
+        <p:nvSpPr>
+          <p:cNvPr id="2" name="Title 1">
+            <a:extLst>
+              <a:ext uri="{FF2B5EF4-FFF2-40B4-BE49-F238E27FC236}">
+                <a16:creationId xmlns:a16="http://schemas.microsoft.com/office/drawing/2014/main" id="{F8A82A16-C2E0-F44B-B173-6A53DBB62D99}"/>
+              </a:ext>
+            </a:extLst>
+          </p:cNvPr>
+          <p:cNvSpPr>
+            <a:spLocks noGrp="1"/>
+          </p:cNvSpPr>
+          <p:nvPr>
+            <p:ph type="title"/>
+          </p:nvPr>
+        </p:nvSpPr>
+        <p:spPr>
+          <a:xfrm>
+            <a:off x="500203" y="320677"/>
+            <a:ext cx="10942380" cy="1087060"/>
+          </a:xfrm>
+        </p:spPr>
+        <p:txBody>
+          <a:bodyPr>
+            <a:normAutofit/>
+          </a:bodyPr>
+          <a:lstStyle/>
+          <a:p>
+            <a:r>
+              <a:rPr lang="en-US" dirty="0"/>
+              <a:t>Reduction w/ locally nameless terms</a:t>
+            </a:r>
+          </a:p>
+        </p:txBody>
+      </p:sp>
+      <p:sp>
+        <p:nvSpPr>
+          <p:cNvPr id="3" name="Content Placeholder 2">
+            <a:extLst>
+              <a:ext uri="{FF2B5EF4-FFF2-40B4-BE49-F238E27FC236}">
+                <a16:creationId xmlns:a16="http://schemas.microsoft.com/office/drawing/2014/main" id="{CA4DC282-9CD0-9D44-9D0B-D233CDEF34F5}"/>
+              </a:ext>
+            </a:extLst>
+          </p:cNvPr>
+          <p:cNvSpPr>
+            <a:spLocks noGrp="1"/>
+          </p:cNvSpPr>
+          <p:nvPr>
+            <p:ph idx="1"/>
+          </p:nvPr>
+        </p:nvSpPr>
+        <p:spPr>
+          <a:xfrm>
+            <a:off x="626712" y="1407737"/>
+            <a:ext cx="9932729" cy="4618399"/>
+          </a:xfrm>
+        </p:spPr>
+        <p:txBody>
+          <a:bodyPr/>
+          <a:lstStyle/>
+          <a:p>
+            <a:pPr marL="0" indent="0">
+              <a:buNone/>
+            </a:pPr>
+            <a:r>
+              <a:rPr lang="en-US" sz="2000" dirty="0" err="1">
+                <a:solidFill>
+                  <a:srgbClr val="795E26"/>
+                </a:solidFill>
+                <a:latin typeface="Menlo" panose="020B0609030804020204" pitchFamily="49" charset="0"/>
+              </a:rPr>
+              <a:t>nfd</a:t>
+            </a:r>
+            <a:r>
+              <a:rPr lang="en-US" sz="2000" dirty="0">
+                <a:solidFill>
+                  <a:srgbClr val="000000"/>
+                </a:solidFill>
+                <a:latin typeface="Menlo" panose="020B0609030804020204" pitchFamily="49" charset="0"/>
+              </a:rPr>
+              <a:t> :: </a:t>
+            </a:r>
+            <a:r>
+              <a:rPr lang="en-US" sz="2000" dirty="0">
+                <a:solidFill>
+                  <a:srgbClr val="0000FF"/>
+                </a:solidFill>
+                <a:latin typeface="Menlo" panose="020B0609030804020204" pitchFamily="49" charset="0"/>
+              </a:rPr>
+              <a:t>Exp</a:t>
+            </a:r>
+            <a:r>
+              <a:rPr lang="en-US" sz="2000" dirty="0">
+                <a:solidFill>
+                  <a:srgbClr val="000000"/>
+                </a:solidFill>
+                <a:latin typeface="Menlo" panose="020B0609030804020204" pitchFamily="49" charset="0"/>
+              </a:rPr>
+              <a:t> -&gt; </a:t>
+            </a:r>
+            <a:r>
+              <a:rPr lang="en-US" sz="2000" dirty="0" err="1">
+                <a:solidFill>
+                  <a:srgbClr val="0000FF"/>
+                </a:solidFill>
+                <a:latin typeface="Menlo" panose="020B0609030804020204" pitchFamily="49" charset="0"/>
+              </a:rPr>
+              <a:t>FreshM</a:t>
+            </a:r>
+            <a:r>
+              <a:rPr lang="en-US" sz="2000" dirty="0">
+                <a:solidFill>
+                  <a:srgbClr val="000000"/>
+                </a:solidFill>
+                <a:latin typeface="Menlo" panose="020B0609030804020204" pitchFamily="49" charset="0"/>
+              </a:rPr>
+              <a:t> </a:t>
+            </a:r>
+            <a:r>
+              <a:rPr lang="en-US" sz="2000" dirty="0">
+                <a:solidFill>
+                  <a:srgbClr val="0000FF"/>
+                </a:solidFill>
+                <a:latin typeface="Menlo" panose="020B0609030804020204" pitchFamily="49" charset="0"/>
+              </a:rPr>
+              <a:t>Exp</a:t>
+            </a:r>
+            <a:endParaRPr lang="en-US" sz="2000" dirty="0">
+              <a:solidFill>
+                <a:srgbClr val="000000"/>
+              </a:solidFill>
+              <a:latin typeface="Menlo" panose="020B0609030804020204" pitchFamily="49" charset="0"/>
+            </a:endParaRPr>
+          </a:p>
+          <a:p>
+            <a:pPr marL="0" indent="0">
+              <a:buNone/>
+            </a:pPr>
+            <a:r>
+              <a:rPr lang="en-US" sz="2000" dirty="0" err="1">
+                <a:solidFill>
+                  <a:srgbClr val="000000"/>
+                </a:solidFill>
+                <a:latin typeface="Menlo" panose="020B0609030804020204" pitchFamily="49" charset="0"/>
+              </a:rPr>
+              <a:t>nfd</a:t>
+            </a:r>
+            <a:r>
+              <a:rPr lang="en-US" sz="2000" dirty="0">
+                <a:solidFill>
+                  <a:srgbClr val="000000"/>
+                </a:solidFill>
+                <a:latin typeface="Menlo" panose="020B0609030804020204" pitchFamily="49" charset="0"/>
+              </a:rPr>
+              <a:t> (Var x) = return (Var x)</a:t>
+            </a:r>
+          </a:p>
+          <a:p>
+            <a:pPr marL="0" indent="0">
+              <a:buNone/>
+            </a:pPr>
+            <a:r>
+              <a:rPr lang="en-US" sz="2000" dirty="0" err="1">
+                <a:solidFill>
+                  <a:srgbClr val="000000"/>
+                </a:solidFill>
+                <a:latin typeface="Menlo" panose="020B0609030804020204" pitchFamily="49" charset="0"/>
+              </a:rPr>
+              <a:t>nfd</a:t>
+            </a:r>
+            <a:r>
+              <a:rPr lang="en-US" sz="2000" dirty="0">
+                <a:solidFill>
+                  <a:srgbClr val="000000"/>
+                </a:solidFill>
+                <a:latin typeface="Menlo" panose="020B0609030804020204" pitchFamily="49" charset="0"/>
+              </a:rPr>
+              <a:t> (Lam e) = </a:t>
+            </a:r>
+            <a:r>
+              <a:rPr lang="en-US" sz="2000" dirty="0">
+                <a:solidFill>
+                  <a:srgbClr val="AF00DB"/>
+                </a:solidFill>
+                <a:latin typeface="Menlo" panose="020B0609030804020204" pitchFamily="49" charset="0"/>
+              </a:rPr>
+              <a:t>do</a:t>
+            </a:r>
+            <a:endParaRPr lang="en-US" sz="2000" dirty="0">
+              <a:solidFill>
+                <a:srgbClr val="000000"/>
+              </a:solidFill>
+              <a:latin typeface="Menlo" panose="020B0609030804020204" pitchFamily="49" charset="0"/>
+            </a:endParaRPr>
+          </a:p>
+          <a:p>
+            <a:pPr marL="0" indent="0">
+              <a:buNone/>
+            </a:pPr>
+            <a:r>
+              <a:rPr lang="en-US" sz="2000" dirty="0">
+                <a:solidFill>
+                  <a:srgbClr val="000000"/>
+                </a:solidFill>
+                <a:latin typeface="Menlo" panose="020B0609030804020204" pitchFamily="49" charset="0"/>
+              </a:rPr>
+              <a:t>  (x, e') &lt;- unbind e</a:t>
+            </a:r>
+          </a:p>
+          <a:p>
+            <a:pPr marL="0" indent="0">
+              <a:buNone/>
+            </a:pPr>
+            <a:r>
+              <a:rPr lang="en-US" sz="2000" dirty="0">
+                <a:solidFill>
+                  <a:srgbClr val="000000"/>
+                </a:solidFill>
+                <a:latin typeface="Menlo" panose="020B0609030804020204" pitchFamily="49" charset="0"/>
+              </a:rPr>
+              <a:t>  e1 &lt;- </a:t>
+            </a:r>
+            <a:r>
+              <a:rPr lang="en-US" sz="2000" dirty="0" err="1">
+                <a:solidFill>
+                  <a:srgbClr val="000000"/>
+                </a:solidFill>
+                <a:latin typeface="Menlo" panose="020B0609030804020204" pitchFamily="49" charset="0"/>
+              </a:rPr>
+              <a:t>nfd</a:t>
+            </a:r>
+            <a:r>
+              <a:rPr lang="en-US" sz="2000" dirty="0">
+                <a:solidFill>
+                  <a:srgbClr val="000000"/>
+                </a:solidFill>
+                <a:latin typeface="Menlo" panose="020B0609030804020204" pitchFamily="49" charset="0"/>
+              </a:rPr>
+              <a:t> e'</a:t>
+            </a:r>
+          </a:p>
+          <a:p>
+            <a:pPr marL="0" indent="0">
+              <a:buNone/>
+            </a:pPr>
+            <a:r>
+              <a:rPr lang="en-US" sz="2000" dirty="0">
+                <a:solidFill>
+                  <a:srgbClr val="000000"/>
+                </a:solidFill>
+                <a:latin typeface="Menlo" panose="020B0609030804020204" pitchFamily="49" charset="0"/>
+              </a:rPr>
+              <a:t>  return $ Lam (bind x e1)</a:t>
+            </a:r>
+          </a:p>
+          <a:p>
+            <a:pPr marL="0" indent="0">
+              <a:buNone/>
+            </a:pPr>
+            <a:r>
+              <a:rPr lang="en-US" sz="2000" dirty="0" err="1">
+                <a:solidFill>
+                  <a:srgbClr val="000000"/>
+                </a:solidFill>
+                <a:latin typeface="Menlo" panose="020B0609030804020204" pitchFamily="49" charset="0"/>
+              </a:rPr>
+              <a:t>nfd</a:t>
+            </a:r>
+            <a:r>
+              <a:rPr lang="en-US" sz="2000" dirty="0">
+                <a:solidFill>
+                  <a:srgbClr val="000000"/>
+                </a:solidFill>
+                <a:latin typeface="Menlo" panose="020B0609030804020204" pitchFamily="49" charset="0"/>
+              </a:rPr>
+              <a:t> (App f a) = </a:t>
+            </a:r>
+            <a:r>
+              <a:rPr lang="en-US" sz="2000" dirty="0">
+                <a:solidFill>
+                  <a:srgbClr val="AF00DB"/>
+                </a:solidFill>
+                <a:latin typeface="Menlo" panose="020B0609030804020204" pitchFamily="49" charset="0"/>
+              </a:rPr>
+              <a:t>do</a:t>
+            </a:r>
+            <a:endParaRPr lang="en-US" sz="2000" dirty="0">
+              <a:solidFill>
+                <a:srgbClr val="000000"/>
+              </a:solidFill>
+              <a:latin typeface="Menlo" panose="020B0609030804020204" pitchFamily="49" charset="0"/>
+            </a:endParaRPr>
+          </a:p>
+          <a:p>
+            <a:pPr marL="0" indent="0">
+              <a:buNone/>
+            </a:pPr>
+            <a:r>
+              <a:rPr lang="en-US" sz="2000" dirty="0">
+                <a:solidFill>
+                  <a:srgbClr val="000000"/>
+                </a:solidFill>
+                <a:latin typeface="Menlo" panose="020B0609030804020204" pitchFamily="49" charset="0"/>
+              </a:rPr>
+              <a:t>  f' &lt;- </a:t>
+            </a:r>
+            <a:r>
+              <a:rPr lang="en-US" sz="2000" dirty="0" err="1">
+                <a:solidFill>
+                  <a:srgbClr val="000000"/>
+                </a:solidFill>
+                <a:latin typeface="Menlo" panose="020B0609030804020204" pitchFamily="49" charset="0"/>
+              </a:rPr>
+              <a:t>whnf</a:t>
+            </a:r>
+            <a:r>
+              <a:rPr lang="en-US" sz="2000" dirty="0">
+                <a:solidFill>
+                  <a:srgbClr val="000000"/>
+                </a:solidFill>
+                <a:latin typeface="Menlo" panose="020B0609030804020204" pitchFamily="49" charset="0"/>
+              </a:rPr>
+              <a:t> f</a:t>
+            </a:r>
+          </a:p>
+          <a:p>
+            <a:pPr marL="0" indent="0">
+              <a:buNone/>
+            </a:pPr>
+            <a:r>
+              <a:rPr lang="en-US" sz="2000" dirty="0">
+                <a:solidFill>
+                  <a:srgbClr val="AF00DB"/>
+                </a:solidFill>
+                <a:latin typeface="Menlo" panose="020B0609030804020204" pitchFamily="49" charset="0"/>
+              </a:rPr>
+              <a:t>case</a:t>
+            </a:r>
+            <a:r>
+              <a:rPr lang="en-US" sz="2000" dirty="0">
+                <a:solidFill>
+                  <a:srgbClr val="000000"/>
+                </a:solidFill>
+                <a:latin typeface="Menlo" panose="020B0609030804020204" pitchFamily="49" charset="0"/>
+              </a:rPr>
+              <a:t> f' </a:t>
+            </a:r>
+            <a:r>
+              <a:rPr lang="en-US" sz="2000" dirty="0">
+                <a:solidFill>
+                  <a:srgbClr val="AF00DB"/>
+                </a:solidFill>
+                <a:latin typeface="Menlo" panose="020B0609030804020204" pitchFamily="49" charset="0"/>
+              </a:rPr>
+              <a:t>of</a:t>
+            </a:r>
+            <a:endParaRPr lang="en-US" sz="2000" dirty="0">
+              <a:solidFill>
+                <a:srgbClr val="000000"/>
+              </a:solidFill>
+              <a:latin typeface="Menlo" panose="020B0609030804020204" pitchFamily="49" charset="0"/>
+            </a:endParaRPr>
+          </a:p>
+          <a:p>
+            <a:pPr marL="0" indent="0">
+              <a:buNone/>
+            </a:pPr>
+            <a:r>
+              <a:rPr lang="en-US" sz="2000" dirty="0">
+                <a:solidFill>
+                  <a:srgbClr val="000000"/>
+                </a:solidFill>
+                <a:latin typeface="Menlo" panose="020B0609030804020204" pitchFamily="49" charset="0"/>
+              </a:rPr>
+              <a:t>  Lam b -&gt; </a:t>
+            </a:r>
+            <a:r>
+              <a:rPr lang="en-US" sz="2000" dirty="0">
+                <a:solidFill>
+                  <a:srgbClr val="AF00DB"/>
+                </a:solidFill>
+                <a:latin typeface="Menlo" panose="020B0609030804020204" pitchFamily="49" charset="0"/>
+              </a:rPr>
+              <a:t>do</a:t>
+            </a:r>
+            <a:endParaRPr lang="en-US" sz="2000" dirty="0">
+              <a:solidFill>
+                <a:srgbClr val="000000"/>
+              </a:solidFill>
+              <a:latin typeface="Menlo" panose="020B0609030804020204" pitchFamily="49" charset="0"/>
+            </a:endParaRPr>
+          </a:p>
+          <a:p>
+            <a:pPr marL="0" indent="0">
+              <a:buNone/>
+            </a:pPr>
+            <a:r>
+              <a:rPr lang="en-US" sz="2000" dirty="0">
+                <a:solidFill>
+                  <a:srgbClr val="000000"/>
+                </a:solidFill>
+                <a:latin typeface="Menlo" panose="020B0609030804020204" pitchFamily="49" charset="0"/>
+              </a:rPr>
+              <a:t>    </a:t>
+            </a:r>
+            <a:r>
+              <a:rPr lang="en-US" sz="2000" dirty="0" err="1">
+                <a:solidFill>
+                  <a:srgbClr val="000000"/>
+                </a:solidFill>
+                <a:latin typeface="Menlo" panose="020B0609030804020204" pitchFamily="49" charset="0"/>
+              </a:rPr>
+              <a:t>nfd</a:t>
+            </a:r>
+            <a:r>
+              <a:rPr lang="en-US" sz="2000" dirty="0">
+                <a:solidFill>
+                  <a:srgbClr val="000000"/>
+                </a:solidFill>
+                <a:latin typeface="Menlo" panose="020B0609030804020204" pitchFamily="49" charset="0"/>
+              </a:rPr>
+              <a:t> (</a:t>
+            </a:r>
+            <a:r>
+              <a:rPr lang="en-US" sz="2000" b="1" dirty="0">
+                <a:solidFill>
+                  <a:srgbClr val="000000"/>
+                </a:solidFill>
+                <a:latin typeface="Menlo" panose="020B0609030804020204" pitchFamily="49" charset="0"/>
+              </a:rPr>
+              <a:t>instantiate</a:t>
+            </a:r>
+            <a:r>
+              <a:rPr lang="en-US" sz="2000" dirty="0">
+                <a:solidFill>
+                  <a:srgbClr val="000000"/>
+                </a:solidFill>
+                <a:latin typeface="Menlo" panose="020B0609030804020204" pitchFamily="49" charset="0"/>
+              </a:rPr>
+              <a:t> a b)      </a:t>
+            </a:r>
+            <a:r>
+              <a:rPr lang="en-US" sz="2000" dirty="0">
+                <a:solidFill>
+                  <a:schemeClr val="accent6"/>
+                </a:solidFill>
+                <a:latin typeface="Menlo" panose="020B0609030804020204" pitchFamily="49" charset="0"/>
+              </a:rPr>
+              <a:t>-- bound variable substitution</a:t>
+            </a:r>
+          </a:p>
+          <a:p>
+            <a:pPr marL="0" indent="0">
+              <a:buNone/>
+            </a:pPr>
+            <a:r>
+              <a:rPr lang="en-US" sz="2000" dirty="0">
+                <a:solidFill>
+                  <a:schemeClr val="accent6"/>
+                </a:solidFill>
+                <a:latin typeface="Menlo" panose="020B0609030804020204" pitchFamily="49" charset="0"/>
+              </a:rPr>
+              <a:t>                               -- (can be defined generically)</a:t>
+            </a:r>
+          </a:p>
+          <a:p>
+            <a:pPr marL="0" indent="0">
+              <a:buNone/>
+            </a:pPr>
+            <a:r>
+              <a:rPr lang="en-US" sz="2000" dirty="0">
+                <a:solidFill>
+                  <a:srgbClr val="000000"/>
+                </a:solidFill>
+                <a:latin typeface="Menlo" panose="020B0609030804020204" pitchFamily="49" charset="0"/>
+              </a:rPr>
+              <a:t>_ -&gt; App &lt;$&gt; </a:t>
+            </a:r>
+            <a:r>
+              <a:rPr lang="en-US" sz="2000" dirty="0" err="1">
+                <a:solidFill>
+                  <a:srgbClr val="000000"/>
+                </a:solidFill>
+                <a:latin typeface="Menlo" panose="020B0609030804020204" pitchFamily="49" charset="0"/>
+              </a:rPr>
+              <a:t>nfd</a:t>
+            </a:r>
+            <a:r>
+              <a:rPr lang="en-US" sz="2000" dirty="0">
+                <a:solidFill>
+                  <a:srgbClr val="000000"/>
+                </a:solidFill>
+                <a:latin typeface="Menlo" panose="020B0609030804020204" pitchFamily="49" charset="0"/>
+              </a:rPr>
+              <a:t> f' &lt;*&gt; </a:t>
+            </a:r>
+            <a:r>
+              <a:rPr lang="en-US" sz="2000" dirty="0" err="1">
+                <a:solidFill>
+                  <a:srgbClr val="000000"/>
+                </a:solidFill>
+                <a:latin typeface="Menlo" panose="020B0609030804020204" pitchFamily="49" charset="0"/>
+              </a:rPr>
+              <a:t>nfd</a:t>
+            </a:r>
+            <a:r>
+              <a:rPr lang="en-US" sz="2000" dirty="0">
+                <a:solidFill>
+                  <a:srgbClr val="000000"/>
+                </a:solidFill>
+                <a:latin typeface="Menlo" panose="020B0609030804020204" pitchFamily="49" charset="0"/>
+              </a:rPr>
+              <a:t> a</a:t>
+            </a:r>
+          </a:p>
+          <a:p>
+            <a:pPr marL="0" indent="0">
+              <a:buNone/>
+            </a:pPr>
+            <a:endParaRPr lang="en-US" sz="2400" dirty="0">
+              <a:latin typeface="Menlo" panose="020B0609030804020204" pitchFamily="49" charset="0"/>
+              <a:ea typeface="Menlo" panose="020B0609030804020204" pitchFamily="49" charset="0"/>
+              <a:cs typeface="Menlo" panose="020B0609030804020204" pitchFamily="49" charset="0"/>
+            </a:endParaRPr>
+          </a:p>
+          <a:p>
+            <a:pPr marL="0" indent="0">
+              <a:buNone/>
+            </a:pPr>
+            <a:r>
+              <a:rPr lang="en-US" sz="2400" dirty="0">
+                <a:latin typeface="Menlo" panose="020B0609030804020204" pitchFamily="49" charset="0"/>
+                <a:ea typeface="Menlo" panose="020B0609030804020204" pitchFamily="49" charset="0"/>
+                <a:cs typeface="Menlo" panose="020B0609030804020204" pitchFamily="49" charset="0"/>
+              </a:rPr>
+              <a:t>    </a:t>
+            </a:r>
+            <a:br>
+              <a:rPr lang="en-US" dirty="0"/>
+            </a:br>
+            <a:endParaRPr lang="en-US" dirty="0"/>
+          </a:p>
+        </p:txBody>
+      </p:sp>
+      <p:sp>
+        <p:nvSpPr>
+          <p:cNvPr id="4" name="TextBox 3">
+            <a:extLst>
+              <a:ext uri="{FF2B5EF4-FFF2-40B4-BE49-F238E27FC236}">
+                <a16:creationId xmlns:a16="http://schemas.microsoft.com/office/drawing/2014/main" id="{358C299E-AD14-1645-BD36-AA8FAF7A7F38}"/>
+              </a:ext>
+            </a:extLst>
+          </p:cNvPr>
+          <p:cNvSpPr txBox="1"/>
+          <p:nvPr/>
+        </p:nvSpPr>
+        <p:spPr>
+          <a:xfrm>
+            <a:off x="6576091" y="1407737"/>
+            <a:ext cx="3262432" cy="954107"/>
+          </a:xfrm>
+          <a:prstGeom prst="rect">
+            <a:avLst/>
+          </a:prstGeom>
+          <a:noFill/>
+        </p:spPr>
+        <p:txBody>
+          <a:bodyPr wrap="none" rtlCol="0">
+            <a:spAutoFit/>
+          </a:bodyPr>
+          <a:lstStyle/>
+          <a:p>
+            <a:r>
+              <a:rPr lang="en-US" sz="2000" dirty="0" err="1">
+                <a:solidFill>
+                  <a:srgbClr val="795E26"/>
+                </a:solidFill>
+                <a:latin typeface="Menlo" panose="020B0609030804020204" pitchFamily="49" charset="0"/>
+              </a:rPr>
+              <a:t>nf</a:t>
+            </a:r>
+            <a:r>
+              <a:rPr lang="en-US" sz="2000" dirty="0">
+                <a:solidFill>
+                  <a:srgbClr val="000000"/>
+                </a:solidFill>
+                <a:latin typeface="Menlo" panose="020B0609030804020204" pitchFamily="49" charset="0"/>
+              </a:rPr>
+              <a:t> :: </a:t>
+            </a:r>
+            <a:r>
+              <a:rPr lang="en-US" sz="2000" dirty="0">
+                <a:solidFill>
+                  <a:srgbClr val="0000FF"/>
+                </a:solidFill>
+                <a:latin typeface="Menlo" panose="020B0609030804020204" pitchFamily="49" charset="0"/>
+              </a:rPr>
+              <a:t>Exp</a:t>
+            </a:r>
+            <a:r>
+              <a:rPr lang="en-US" sz="2000" dirty="0">
+                <a:solidFill>
+                  <a:srgbClr val="000000"/>
+                </a:solidFill>
+                <a:latin typeface="Menlo" panose="020B0609030804020204" pitchFamily="49" charset="0"/>
+              </a:rPr>
+              <a:t> -&gt; </a:t>
+            </a:r>
+            <a:r>
+              <a:rPr lang="en-US" sz="2000" dirty="0">
+                <a:solidFill>
+                  <a:srgbClr val="0000FF"/>
+                </a:solidFill>
+                <a:latin typeface="Menlo" panose="020B0609030804020204" pitchFamily="49" charset="0"/>
+              </a:rPr>
+              <a:t>Exp</a:t>
+            </a:r>
+            <a:endParaRPr lang="en-US" sz="2000" dirty="0">
+              <a:solidFill>
+                <a:srgbClr val="000000"/>
+              </a:solidFill>
+              <a:latin typeface="Menlo" panose="020B0609030804020204" pitchFamily="49" charset="0"/>
+            </a:endParaRPr>
+          </a:p>
+          <a:p>
+            <a:r>
+              <a:rPr lang="en-US" sz="2000" dirty="0" err="1">
+                <a:solidFill>
+                  <a:srgbClr val="000000"/>
+                </a:solidFill>
+                <a:latin typeface="Menlo" panose="020B0609030804020204" pitchFamily="49" charset="0"/>
+              </a:rPr>
+              <a:t>nf</a:t>
+            </a:r>
+            <a:r>
+              <a:rPr lang="en-US" sz="2000" dirty="0">
+                <a:solidFill>
+                  <a:srgbClr val="000000"/>
+                </a:solidFill>
+                <a:latin typeface="Menlo" panose="020B0609030804020204" pitchFamily="49" charset="0"/>
+              </a:rPr>
+              <a:t> = </a:t>
+            </a:r>
+            <a:r>
+              <a:rPr lang="en-US" sz="2000" dirty="0" err="1">
+                <a:solidFill>
+                  <a:srgbClr val="000000"/>
+                </a:solidFill>
+                <a:latin typeface="Menlo" panose="020B0609030804020204" pitchFamily="49" charset="0"/>
+              </a:rPr>
+              <a:t>runFreshM</a:t>
+            </a:r>
+            <a:r>
+              <a:rPr lang="en-US" sz="2000" dirty="0">
+                <a:solidFill>
+                  <a:srgbClr val="000000"/>
+                </a:solidFill>
+                <a:latin typeface="Menlo" panose="020B0609030804020204" pitchFamily="49" charset="0"/>
+              </a:rPr>
+              <a:t> . </a:t>
+            </a:r>
+            <a:r>
+              <a:rPr lang="en-US" sz="2000" dirty="0" err="1">
+                <a:solidFill>
+                  <a:srgbClr val="000000"/>
+                </a:solidFill>
+                <a:latin typeface="Menlo" panose="020B0609030804020204" pitchFamily="49" charset="0"/>
+              </a:rPr>
+              <a:t>nfd</a:t>
+            </a:r>
+            <a:endParaRPr lang="en-US" sz="2000" dirty="0">
+              <a:solidFill>
+                <a:srgbClr val="000000"/>
+              </a:solidFill>
+              <a:latin typeface="Menlo" panose="020B0609030804020204" pitchFamily="49" charset="0"/>
+            </a:endParaRPr>
+          </a:p>
+          <a:p>
+            <a:endParaRPr lang="en-US" sz="1600" dirty="0"/>
+          </a:p>
+        </p:txBody>
+      </p:sp>
+    </p:spTree>
+    <p:extLst>
+      <p:ext uri="{BB962C8B-B14F-4D97-AF65-F5344CB8AC3E}">
+        <p14:creationId xmlns:p14="http://schemas.microsoft.com/office/powerpoint/2010/main" val="1661429975"/>
+      </p:ext>
+    </p:extLst>
+  </p:cSld>
+  <p:clrMapOvr>
+    <a:masterClrMapping/>
+  </p:clrMapOvr>
+</p:sld>
+</file>
+
 <file path=ppt/slides/slide9.xml><?xml version="1.0" encoding="utf-8"?>
 <p:sld xmlns:a="http://schemas.openxmlformats.org/drawingml/2006/main" xmlns:r="http://schemas.openxmlformats.org/officeDocument/2006/relationships" xmlns:p="http://schemas.openxmlformats.org/presentationml/2006/main">
   <p:cSld>
@@ -14882,7 +14452,7 @@
           <p:cNvPr id="2" name="Title 1">
             <a:extLst>
               <a:ext uri="{FF2B5EF4-FFF2-40B4-BE49-F238E27FC236}">
-                <a16:creationId xmlns:a16="http://schemas.microsoft.com/office/drawing/2014/main" id="{9011FA07-ECDF-1C4C-AE1B-E06E6DA68DAD}"/>
+                <a16:creationId xmlns:a16="http://schemas.microsoft.com/office/drawing/2014/main" id="{71733D05-76FC-F341-B142-E6B3E87B690B}"/>
               </a:ext>
             </a:extLst>
           </p:cNvPr>
@@ -14900,137 +14470,588 @@
           <a:p>
             <a:r>
               <a:rPr lang="en-US" dirty="0"/>
-              <a:t>Benchmark Platform</a:t>
+              <a:t>Implementation interface</a:t>
             </a:r>
           </a:p>
         </p:txBody>
       </p:sp>
       <p:sp>
         <p:nvSpPr>
-          <p:cNvPr id="4" name="Content Placeholder 3">
+          <p:cNvPr id="3" name="Content Placeholder 2">
             <a:extLst>
               <a:ext uri="{FF2B5EF4-FFF2-40B4-BE49-F238E27FC236}">
-                <a16:creationId xmlns:a16="http://schemas.microsoft.com/office/drawing/2014/main" id="{0BFC8706-317E-DA40-BB56-1FD4915DD138}"/>
+                <a16:creationId xmlns:a16="http://schemas.microsoft.com/office/drawing/2014/main" id="{D235C0EA-2726-214E-8F88-1C3D1060FFCC}"/>
               </a:ext>
             </a:extLst>
           </p:cNvPr>
-          <p:cNvSpPr txBox="1">
+          <p:cNvSpPr>
             <a:spLocks noGrp="1"/>
           </p:cNvSpPr>
           <p:nvPr>
             <p:ph idx="1"/>
           </p:nvPr>
         </p:nvSpPr>
-        <p:spPr>
-          <a:xfrm>
-            <a:off x="838200" y="1690688"/>
-            <a:ext cx="10515600" cy="4684359"/>
-          </a:xfrm>
-          <a:prstGeom prst="rect">
-            <a:avLst/>
-          </a:prstGeom>
-          <a:noFill/>
-        </p:spPr>
+        <p:spPr/>
         <p:txBody>
-          <a:bodyPr wrap="square" rtlCol="0">
-            <a:spAutoFit/>
-          </a:bodyPr>
+          <a:bodyPr/>
           <a:lstStyle/>
           <a:p>
+            <a:pPr marL="0" indent="0">
+              <a:buNone/>
+            </a:pPr>
             <a:r>
               <a:rPr lang="en-US" dirty="0">
-                <a:hlinkClick r:id="rId2"/>
-              </a:rPr>
-              <a:t>https://github.com/sweirich/lambda-n-ways/</a:t>
-            </a:r>
+                <a:solidFill>
+                  <a:srgbClr val="0000FF"/>
+                </a:solidFill>
+                <a:latin typeface="Menlo" panose="020B0609030804020204" pitchFamily="49" charset="0"/>
+              </a:rPr>
+              <a:t>data</a:t>
+            </a:r>
+            <a:r>
+              <a:rPr lang="en-US" dirty="0">
+                <a:solidFill>
+                  <a:srgbClr val="000000"/>
+                </a:solidFill>
+                <a:latin typeface="Menlo" panose="020B0609030804020204" pitchFamily="49" charset="0"/>
+              </a:rPr>
+              <a:t> </a:t>
+            </a:r>
+            <a:r>
+              <a:rPr lang="en-US" dirty="0" err="1">
+                <a:solidFill>
+                  <a:srgbClr val="0000FF"/>
+                </a:solidFill>
+                <a:latin typeface="Menlo" panose="020B0609030804020204" pitchFamily="49" charset="0"/>
+              </a:rPr>
+              <a:t>LambdaImpl</a:t>
+            </a:r>
+            <a:r>
+              <a:rPr lang="en-US" dirty="0">
+                <a:solidFill>
+                  <a:srgbClr val="000000"/>
+                </a:solidFill>
+                <a:latin typeface="Menlo" panose="020B0609030804020204" pitchFamily="49" charset="0"/>
+              </a:rPr>
+              <a:t> = </a:t>
+            </a:r>
+          </a:p>
+          <a:p>
+            <a:pPr marL="0" indent="0">
+              <a:buNone/>
+            </a:pPr>
+            <a:r>
+              <a:rPr lang="en-US" dirty="0">
+                <a:solidFill>
+                  <a:srgbClr val="000000"/>
+                </a:solidFill>
+                <a:latin typeface="Menlo" panose="020B0609030804020204" pitchFamily="49" charset="0"/>
+              </a:rPr>
+              <a:t>  </a:t>
+            </a:r>
+            <a:r>
+              <a:rPr lang="en-US" dirty="0" err="1">
+                <a:solidFill>
+                  <a:srgbClr val="0000FF"/>
+                </a:solidFill>
+                <a:latin typeface="Menlo" panose="020B0609030804020204" pitchFamily="49" charset="0"/>
+              </a:rPr>
+              <a:t>forall</a:t>
+            </a:r>
+            <a:r>
+              <a:rPr lang="en-US" dirty="0">
+                <a:solidFill>
+                  <a:srgbClr val="000000"/>
+                </a:solidFill>
+                <a:latin typeface="Menlo" panose="020B0609030804020204" pitchFamily="49" charset="0"/>
+              </a:rPr>
+              <a:t> </a:t>
+            </a:r>
+            <a:r>
+              <a:rPr lang="en-US" dirty="0">
+                <a:solidFill>
+                  <a:srgbClr val="001080"/>
+                </a:solidFill>
+                <a:latin typeface="Menlo" panose="020B0609030804020204" pitchFamily="49" charset="0"/>
+              </a:rPr>
+              <a:t>a</a:t>
+            </a:r>
+            <a:r>
+              <a:rPr lang="en-US" dirty="0">
+                <a:solidFill>
+                  <a:srgbClr val="000000"/>
+                </a:solidFill>
+                <a:latin typeface="Menlo" panose="020B0609030804020204" pitchFamily="49" charset="0"/>
+              </a:rPr>
+              <a:t>. </a:t>
+            </a:r>
+            <a:r>
+              <a:rPr lang="en-US" dirty="0" err="1">
+                <a:solidFill>
+                  <a:srgbClr val="0000FF"/>
+                </a:solidFill>
+                <a:latin typeface="Menlo" panose="020B0609030804020204" pitchFamily="49" charset="0"/>
+              </a:rPr>
+              <a:t>NFData</a:t>
+            </a:r>
+            <a:r>
+              <a:rPr lang="en-US" dirty="0">
+                <a:solidFill>
+                  <a:srgbClr val="000000"/>
+                </a:solidFill>
+                <a:latin typeface="Menlo" panose="020B0609030804020204" pitchFamily="49" charset="0"/>
+              </a:rPr>
+              <a:t> </a:t>
+            </a:r>
+            <a:r>
+              <a:rPr lang="en-US" dirty="0">
+                <a:solidFill>
+                  <a:srgbClr val="001080"/>
+                </a:solidFill>
+                <a:latin typeface="Menlo" panose="020B0609030804020204" pitchFamily="49" charset="0"/>
+              </a:rPr>
+              <a:t>a</a:t>
+            </a:r>
+            <a:r>
+              <a:rPr lang="en-US" dirty="0">
+                <a:solidFill>
+                  <a:srgbClr val="000000"/>
+                </a:solidFill>
+                <a:latin typeface="Menlo" panose="020B0609030804020204" pitchFamily="49" charset="0"/>
+              </a:rPr>
+              <a:t> =&gt; </a:t>
+            </a:r>
+            <a:r>
+              <a:rPr lang="en-US" dirty="0" err="1">
+                <a:solidFill>
+                  <a:srgbClr val="000000"/>
+                </a:solidFill>
+                <a:latin typeface="Menlo" panose="020B0609030804020204" pitchFamily="49" charset="0"/>
+              </a:rPr>
+              <a:t>LambdaImpl</a:t>
+            </a:r>
+            <a:endParaRPr lang="en-US" dirty="0">
+              <a:solidFill>
+                <a:srgbClr val="000000"/>
+              </a:solidFill>
+              <a:latin typeface="Menlo" panose="020B0609030804020204" pitchFamily="49" charset="0"/>
+            </a:endParaRPr>
+          </a:p>
+          <a:p>
+            <a:pPr marL="0" indent="0">
+              <a:buNone/>
+            </a:pPr>
+            <a:r>
+              <a:rPr lang="en-US" dirty="0">
+                <a:solidFill>
+                  <a:srgbClr val="000000"/>
+                </a:solidFill>
+                <a:latin typeface="Menlo" panose="020B0609030804020204" pitchFamily="49" charset="0"/>
+              </a:rPr>
+              <a:t>  { </a:t>
+            </a:r>
+            <a:r>
+              <a:rPr lang="en-US" dirty="0" err="1">
+                <a:solidFill>
+                  <a:srgbClr val="001080"/>
+                </a:solidFill>
+                <a:latin typeface="Menlo" panose="020B0609030804020204" pitchFamily="49" charset="0"/>
+              </a:rPr>
+              <a:t>impl_name</a:t>
+            </a:r>
+            <a:r>
+              <a:rPr lang="en-US" dirty="0">
+                <a:solidFill>
+                  <a:srgbClr val="000000"/>
+                </a:solidFill>
+                <a:latin typeface="Menlo" panose="020B0609030804020204" pitchFamily="49" charset="0"/>
+              </a:rPr>
+              <a:t> :: </a:t>
+            </a:r>
+            <a:r>
+              <a:rPr lang="en-US" dirty="0">
+                <a:solidFill>
+                  <a:srgbClr val="0000FF"/>
+                </a:solidFill>
+                <a:latin typeface="Menlo" panose="020B0609030804020204" pitchFamily="49" charset="0"/>
+              </a:rPr>
+              <a:t>String</a:t>
+            </a:r>
+            <a:r>
+              <a:rPr lang="en-US" dirty="0">
+                <a:solidFill>
+                  <a:srgbClr val="000000"/>
+                </a:solidFill>
+                <a:latin typeface="Menlo" panose="020B0609030804020204" pitchFamily="49" charset="0"/>
+              </a:rPr>
+              <a:t>,</a:t>
+            </a:r>
+          </a:p>
+          <a:p>
+            <a:pPr marL="0" indent="0">
+              <a:buNone/>
+            </a:pPr>
+            <a:r>
+              <a:rPr lang="en-US" dirty="0">
+                <a:solidFill>
+                  <a:srgbClr val="001080"/>
+                </a:solidFill>
+                <a:latin typeface="Menlo" panose="020B0609030804020204" pitchFamily="49" charset="0"/>
+              </a:rPr>
+              <a:t>    </a:t>
+            </a:r>
+            <a:r>
+              <a:rPr lang="en-US" dirty="0" err="1">
+                <a:solidFill>
+                  <a:srgbClr val="001080"/>
+                </a:solidFill>
+                <a:latin typeface="Menlo" panose="020B0609030804020204" pitchFamily="49" charset="0"/>
+              </a:rPr>
+              <a:t>impl_fromLC</a:t>
+            </a:r>
+            <a:r>
+              <a:rPr lang="en-US" dirty="0">
+                <a:solidFill>
+                  <a:srgbClr val="000000"/>
+                </a:solidFill>
+                <a:latin typeface="Menlo" panose="020B0609030804020204" pitchFamily="49" charset="0"/>
+              </a:rPr>
+              <a:t> :: </a:t>
+            </a:r>
+            <a:r>
+              <a:rPr lang="en-US" dirty="0">
+                <a:solidFill>
+                  <a:srgbClr val="0000FF"/>
+                </a:solidFill>
+                <a:latin typeface="Menlo" panose="020B0609030804020204" pitchFamily="49" charset="0"/>
+              </a:rPr>
+              <a:t>LC</a:t>
+            </a:r>
+            <a:r>
+              <a:rPr lang="en-US" dirty="0">
+                <a:solidFill>
+                  <a:srgbClr val="000000"/>
+                </a:solidFill>
+                <a:latin typeface="Menlo" panose="020B0609030804020204" pitchFamily="49" charset="0"/>
+              </a:rPr>
+              <a:t> </a:t>
+            </a:r>
+            <a:r>
+              <a:rPr lang="en-US" dirty="0" err="1">
+                <a:solidFill>
+                  <a:srgbClr val="0000FF"/>
+                </a:solidFill>
+                <a:latin typeface="Menlo" panose="020B0609030804020204" pitchFamily="49" charset="0"/>
+              </a:rPr>
+              <a:t>IdInt</a:t>
+            </a:r>
+            <a:r>
+              <a:rPr lang="en-US" dirty="0">
+                <a:solidFill>
+                  <a:srgbClr val="000000"/>
+                </a:solidFill>
+                <a:latin typeface="Menlo" panose="020B0609030804020204" pitchFamily="49" charset="0"/>
+              </a:rPr>
+              <a:t> -&gt; </a:t>
+            </a:r>
+            <a:r>
+              <a:rPr lang="en-US" dirty="0">
+                <a:solidFill>
+                  <a:srgbClr val="001080"/>
+                </a:solidFill>
+                <a:latin typeface="Menlo" panose="020B0609030804020204" pitchFamily="49" charset="0"/>
+              </a:rPr>
+              <a:t>a</a:t>
+            </a:r>
+            <a:r>
+              <a:rPr lang="en-US" dirty="0">
+                <a:solidFill>
+                  <a:srgbClr val="000000"/>
+                </a:solidFill>
+                <a:latin typeface="Menlo" panose="020B0609030804020204" pitchFamily="49" charset="0"/>
+              </a:rPr>
+              <a:t>,</a:t>
+            </a:r>
+          </a:p>
+          <a:p>
+            <a:pPr marL="0" indent="0">
+              <a:buNone/>
+            </a:pPr>
+            <a:r>
+              <a:rPr lang="en-US" dirty="0">
+                <a:solidFill>
+                  <a:srgbClr val="001080"/>
+                </a:solidFill>
+                <a:latin typeface="Menlo" panose="020B0609030804020204" pitchFamily="49" charset="0"/>
+              </a:rPr>
+              <a:t>    </a:t>
+            </a:r>
+            <a:r>
+              <a:rPr lang="en-US" dirty="0" err="1">
+                <a:solidFill>
+                  <a:srgbClr val="001080"/>
+                </a:solidFill>
+                <a:latin typeface="Menlo" panose="020B0609030804020204" pitchFamily="49" charset="0"/>
+              </a:rPr>
+              <a:t>impl_toLC</a:t>
+            </a:r>
+            <a:r>
+              <a:rPr lang="en-US" dirty="0">
+                <a:solidFill>
+                  <a:srgbClr val="000000"/>
+                </a:solidFill>
+                <a:latin typeface="Menlo" panose="020B0609030804020204" pitchFamily="49" charset="0"/>
+              </a:rPr>
+              <a:t> :: </a:t>
+            </a:r>
+            <a:r>
+              <a:rPr lang="en-US" dirty="0">
+                <a:solidFill>
+                  <a:srgbClr val="001080"/>
+                </a:solidFill>
+                <a:latin typeface="Menlo" panose="020B0609030804020204" pitchFamily="49" charset="0"/>
+              </a:rPr>
+              <a:t>a</a:t>
+            </a:r>
+            <a:r>
+              <a:rPr lang="en-US" dirty="0">
+                <a:solidFill>
+                  <a:srgbClr val="000000"/>
+                </a:solidFill>
+                <a:latin typeface="Menlo" panose="020B0609030804020204" pitchFamily="49" charset="0"/>
+              </a:rPr>
+              <a:t> -&gt; </a:t>
+            </a:r>
+            <a:r>
+              <a:rPr lang="en-US" dirty="0">
+                <a:solidFill>
+                  <a:srgbClr val="0000FF"/>
+                </a:solidFill>
+                <a:latin typeface="Menlo" panose="020B0609030804020204" pitchFamily="49" charset="0"/>
+              </a:rPr>
+              <a:t>LC</a:t>
+            </a:r>
+            <a:r>
+              <a:rPr lang="en-US" dirty="0">
+                <a:solidFill>
+                  <a:srgbClr val="000000"/>
+                </a:solidFill>
+                <a:latin typeface="Menlo" panose="020B0609030804020204" pitchFamily="49" charset="0"/>
+              </a:rPr>
+              <a:t> </a:t>
+            </a:r>
+            <a:r>
+              <a:rPr lang="en-US" dirty="0" err="1">
+                <a:solidFill>
+                  <a:srgbClr val="0000FF"/>
+                </a:solidFill>
+                <a:latin typeface="Menlo" panose="020B0609030804020204" pitchFamily="49" charset="0"/>
+              </a:rPr>
+              <a:t>IdInt</a:t>
+            </a:r>
+            <a:r>
+              <a:rPr lang="en-US" dirty="0">
+                <a:solidFill>
+                  <a:srgbClr val="000000"/>
+                </a:solidFill>
+                <a:latin typeface="Menlo" panose="020B0609030804020204" pitchFamily="49" charset="0"/>
+              </a:rPr>
+              <a:t>,</a:t>
+            </a:r>
+          </a:p>
+          <a:p>
+            <a:pPr marL="0" indent="0">
+              <a:buNone/>
+            </a:pPr>
+            <a:r>
+              <a:rPr lang="en-US" dirty="0">
+                <a:solidFill>
+                  <a:srgbClr val="001080"/>
+                </a:solidFill>
+                <a:latin typeface="Menlo" panose="020B0609030804020204" pitchFamily="49" charset="0"/>
+              </a:rPr>
+              <a:t>    </a:t>
+            </a:r>
+            <a:r>
+              <a:rPr lang="en-US" dirty="0" err="1">
+                <a:solidFill>
+                  <a:srgbClr val="001080"/>
+                </a:solidFill>
+                <a:latin typeface="Menlo" panose="020B0609030804020204" pitchFamily="49" charset="0"/>
+              </a:rPr>
+              <a:t>impl_nf</a:t>
+            </a:r>
+            <a:r>
+              <a:rPr lang="en-US" dirty="0">
+                <a:solidFill>
+                  <a:srgbClr val="000000"/>
+                </a:solidFill>
+                <a:latin typeface="Menlo" panose="020B0609030804020204" pitchFamily="49" charset="0"/>
+              </a:rPr>
+              <a:t> :: </a:t>
+            </a:r>
+            <a:r>
+              <a:rPr lang="en-US" dirty="0">
+                <a:solidFill>
+                  <a:srgbClr val="001080"/>
+                </a:solidFill>
+                <a:latin typeface="Menlo" panose="020B0609030804020204" pitchFamily="49" charset="0"/>
+              </a:rPr>
+              <a:t>a</a:t>
+            </a:r>
+            <a:r>
+              <a:rPr lang="en-US" dirty="0">
+                <a:solidFill>
+                  <a:srgbClr val="000000"/>
+                </a:solidFill>
+                <a:latin typeface="Menlo" panose="020B0609030804020204" pitchFamily="49" charset="0"/>
+              </a:rPr>
+              <a:t> -&gt; </a:t>
+            </a:r>
+            <a:r>
+              <a:rPr lang="en-US" dirty="0">
+                <a:solidFill>
+                  <a:srgbClr val="001080"/>
+                </a:solidFill>
+                <a:latin typeface="Menlo" panose="020B0609030804020204" pitchFamily="49" charset="0"/>
+              </a:rPr>
+              <a:t>a</a:t>
+            </a:r>
+            <a:r>
+              <a:rPr lang="en-US" dirty="0">
+                <a:solidFill>
+                  <a:srgbClr val="000000"/>
+                </a:solidFill>
+                <a:latin typeface="Menlo" panose="020B0609030804020204" pitchFamily="49" charset="0"/>
+              </a:rPr>
+              <a:t>,</a:t>
+            </a:r>
+          </a:p>
+          <a:p>
+            <a:pPr marL="0" indent="0">
+              <a:buNone/>
+            </a:pPr>
+            <a:r>
+              <a:rPr lang="en-US" dirty="0">
+                <a:solidFill>
+                  <a:srgbClr val="001080"/>
+                </a:solidFill>
+                <a:latin typeface="Menlo" panose="020B0609030804020204" pitchFamily="49" charset="0"/>
+              </a:rPr>
+              <a:t>    </a:t>
+            </a:r>
+            <a:r>
+              <a:rPr lang="en-US" dirty="0" err="1">
+                <a:solidFill>
+                  <a:srgbClr val="001080"/>
+                </a:solidFill>
+                <a:latin typeface="Menlo" panose="020B0609030804020204" pitchFamily="49" charset="0"/>
+              </a:rPr>
+              <a:t>impl_aeq</a:t>
+            </a:r>
+            <a:r>
+              <a:rPr lang="en-US" dirty="0">
+                <a:solidFill>
+                  <a:srgbClr val="000000"/>
+                </a:solidFill>
+                <a:latin typeface="Menlo" panose="020B0609030804020204" pitchFamily="49" charset="0"/>
+              </a:rPr>
+              <a:t> :: </a:t>
+            </a:r>
+            <a:r>
+              <a:rPr lang="en-US" dirty="0">
+                <a:solidFill>
+                  <a:srgbClr val="001080"/>
+                </a:solidFill>
+                <a:latin typeface="Menlo" panose="020B0609030804020204" pitchFamily="49" charset="0"/>
+              </a:rPr>
+              <a:t>a</a:t>
+            </a:r>
+            <a:r>
+              <a:rPr lang="en-US" dirty="0">
+                <a:solidFill>
+                  <a:srgbClr val="000000"/>
+                </a:solidFill>
+                <a:latin typeface="Menlo" panose="020B0609030804020204" pitchFamily="49" charset="0"/>
+              </a:rPr>
+              <a:t> -&gt; </a:t>
+            </a:r>
+            <a:r>
+              <a:rPr lang="en-US" dirty="0">
+                <a:solidFill>
+                  <a:srgbClr val="001080"/>
+                </a:solidFill>
+                <a:latin typeface="Menlo" panose="020B0609030804020204" pitchFamily="49" charset="0"/>
+              </a:rPr>
+              <a:t>a</a:t>
+            </a:r>
+            <a:r>
+              <a:rPr lang="en-US" dirty="0">
+                <a:solidFill>
+                  <a:srgbClr val="000000"/>
+                </a:solidFill>
+                <a:latin typeface="Menlo" panose="020B0609030804020204" pitchFamily="49" charset="0"/>
+              </a:rPr>
+              <a:t> -&gt; </a:t>
+            </a:r>
+            <a:r>
+              <a:rPr lang="en-US" dirty="0">
+                <a:solidFill>
+                  <a:srgbClr val="0000FF"/>
+                </a:solidFill>
+                <a:latin typeface="Menlo" panose="020B0609030804020204" pitchFamily="49" charset="0"/>
+              </a:rPr>
+              <a:t>Bool</a:t>
+            </a:r>
+            <a:endParaRPr lang="en-US" dirty="0">
+              <a:solidFill>
+                <a:srgbClr val="000000"/>
+              </a:solidFill>
+              <a:latin typeface="Menlo" panose="020B0609030804020204" pitchFamily="49" charset="0"/>
+            </a:endParaRPr>
+          </a:p>
+          <a:p>
+            <a:pPr marL="0" indent="0">
+              <a:buNone/>
+            </a:pPr>
+            <a:r>
+              <a:rPr lang="en-US" dirty="0">
+                <a:solidFill>
+                  <a:srgbClr val="000000"/>
+                </a:solidFill>
+                <a:latin typeface="Menlo" panose="020B0609030804020204" pitchFamily="49" charset="0"/>
+              </a:rPr>
+              <a:t>  }</a:t>
+            </a:r>
+          </a:p>
+          <a:p>
+            <a:pPr marL="0" indent="0">
+              <a:buNone/>
+            </a:pPr>
+            <a:br>
+              <a:rPr lang="en-US" dirty="0">
+                <a:solidFill>
+                  <a:srgbClr val="000000"/>
+                </a:solidFill>
+                <a:latin typeface="Menlo" panose="020B0609030804020204" pitchFamily="49" charset="0"/>
+              </a:rPr>
+            </a:br>
+            <a:endParaRPr lang="en-US" dirty="0">
+              <a:solidFill>
+                <a:srgbClr val="000000"/>
+              </a:solidFill>
+              <a:latin typeface="Menlo" panose="020B0609030804020204" pitchFamily="49" charset="0"/>
+            </a:endParaRPr>
+          </a:p>
+          <a:p>
             <a:endParaRPr lang="en-US" dirty="0"/>
-          </a:p>
-          <a:p>
-            <a:r>
-              <a:rPr lang="en-US" dirty="0"/>
-              <a:t>Forked from Lennart </a:t>
-            </a:r>
-            <a:r>
-              <a:rPr lang="en-US" dirty="0" err="1"/>
-              <a:t>Augustsson's</a:t>
-            </a:r>
-            <a:r>
-              <a:rPr lang="en-US" dirty="0"/>
-              <a:t> Lambda-Calculus Four Ways</a:t>
-            </a:r>
-          </a:p>
-          <a:p>
-            <a:pPr lvl="1"/>
-            <a:r>
-              <a:rPr lang="en-US" dirty="0" err="1"/>
-              <a:t>DeBruijn</a:t>
-            </a:r>
-            <a:r>
-              <a:rPr lang="en-US" dirty="0"/>
-              <a:t> indices</a:t>
-            </a:r>
-          </a:p>
-          <a:p>
-            <a:pPr lvl="1"/>
-            <a:r>
-              <a:rPr lang="en-US" dirty="0"/>
-              <a:t>Named (rename to avoid capture)</a:t>
-            </a:r>
-          </a:p>
-          <a:p>
-            <a:pPr lvl="1"/>
-            <a:r>
-              <a:rPr lang="en-US" dirty="0"/>
-              <a:t>Named (globally unique) </a:t>
-            </a:r>
-          </a:p>
-          <a:p>
-            <a:pPr lvl="1"/>
-            <a:r>
-              <a:rPr lang="en-US" dirty="0"/>
-              <a:t>HOAS</a:t>
-            </a:r>
-          </a:p>
-          <a:p>
-            <a:r>
-              <a:rPr lang="en-US" dirty="0"/>
-              <a:t>Common interface</a:t>
-            </a:r>
-          </a:p>
-          <a:p>
-            <a:pPr lvl="1"/>
-            <a:r>
-              <a:rPr lang="en-US" dirty="0"/>
-              <a:t>Representation of untyped lambda-calculus</a:t>
-            </a:r>
-          </a:p>
-          <a:p>
-            <a:pPr lvl="1"/>
-            <a:r>
-              <a:rPr lang="en-US" dirty="0"/>
-              <a:t>Conversion to/from string representation</a:t>
-            </a:r>
-          </a:p>
-          <a:p>
-            <a:pPr lvl="1"/>
-            <a:r>
-              <a:rPr lang="en-US" dirty="0"/>
-              <a:t>Alpha-equivalence</a:t>
-            </a:r>
-          </a:p>
-          <a:p>
-            <a:pPr lvl="1"/>
-            <a:r>
-              <a:rPr lang="en-US" dirty="0"/>
-              <a:t>Full normalization (based on substitution)</a:t>
-            </a:r>
           </a:p>
         </p:txBody>
       </p:sp>
     </p:spTree>
     <p:extLst>
       <p:ext uri="{BB962C8B-B14F-4D97-AF65-F5344CB8AC3E}">
-        <p14:creationId xmlns:p14="http://schemas.microsoft.com/office/powerpoint/2010/main" val="2171200798"/>
+        <p14:creationId xmlns:p14="http://schemas.microsoft.com/office/powerpoint/2010/main" val="726298518"/>
       </p:ext>
     </p:extLst>
   </p:cSld>

</xml_diff>